<commit_message>
ppt updates - resnet updates
</commit_message>
<xml_diff>
--- a/milestones/final_presentation/Final_Presentation.pptx
+++ b/milestones/final_presentation/Final_Presentation.pptx
@@ -7,6 +7,7 @@
   <p:sldIdLst>
     <p:sldId id="256" r:id="rId2"/>
     <p:sldId id="258" r:id="rId3"/>
+    <p:sldId id="259" r:id="rId4"/>
   </p:sldIdLst>
   <p:sldSz cx="12192000" cy="6858000"/>
   <p:notesSz cx="6858000" cy="9144000"/>
@@ -325,9 +326,9 @@
           <a:lstStyle/>
           <a:p>
             <a:fld id="{B61BEF0D-F0BB-DE4B-95CE-6DB70DBA9567}" type="datetimeFigureOut">
-              <a:rPr lang="en-US" dirty="0"/>
+              <a:rPr lang="en-US"/>
               <a:pPr/>
-              <a:t>11/16/19</a:t>
+              <a:t>12/6/19</a:t>
             </a:fld>
             <a:endParaRPr lang="en-US" dirty="0"/>
           </a:p>
@@ -368,7 +369,7 @@
           <a:lstStyle/>
           <a:p>
             <a:fld id="{D57F1E4F-1CFF-5643-939E-217C01CDF565}" type="slidenum">
-              <a:rPr lang="en-US" dirty="0"/>
+              <a:rPr lang="en-US"/>
               <a:pPr/>
               <a:t>‹#›</a:t>
             </a:fld>
@@ -523,10 +524,9 @@
           </a:lstStyle>
           <a:p>
             <a:r>
-              <a:rPr lang="en-US"/>
+              <a:rPr lang="en-US" dirty="0"/>
               <a:t>Click icon to add picture</a:t>
             </a:r>
-            <a:endParaRPr lang="en-US" dirty="0"/>
           </a:p>
         </p:txBody>
       </p:sp>
@@ -613,9 +613,9 @@
           <a:lstStyle/>
           <a:p>
             <a:fld id="{B61BEF0D-F0BB-DE4B-95CE-6DB70DBA9567}" type="datetimeFigureOut">
-              <a:rPr lang="en-US" dirty="0"/>
+              <a:rPr lang="en-US"/>
               <a:pPr/>
-              <a:t>11/16/19</a:t>
+              <a:t>12/6/19</a:t>
             </a:fld>
             <a:endParaRPr lang="en-US" dirty="0"/>
           </a:p>
@@ -656,7 +656,7 @@
           <a:lstStyle/>
           <a:p>
             <a:fld id="{D57F1E4F-1CFF-5643-939E-217C01CDF565}" type="slidenum">
-              <a:rPr lang="en-US" dirty="0"/>
+              <a:rPr lang="en-US"/>
               <a:pPr/>
               <a:t>‹#›</a:t>
             </a:fld>
@@ -869,9 +869,9 @@
           <a:lstStyle/>
           <a:p>
             <a:fld id="{B61BEF0D-F0BB-DE4B-95CE-6DB70DBA9567}" type="datetimeFigureOut">
-              <a:rPr lang="en-US" dirty="0"/>
+              <a:rPr lang="en-US"/>
               <a:pPr/>
-              <a:t>11/16/19</a:t>
+              <a:t>12/6/19</a:t>
             </a:fld>
             <a:endParaRPr lang="en-US" dirty="0"/>
           </a:p>
@@ -912,7 +912,7 @@
           <a:lstStyle/>
           <a:p>
             <a:fld id="{D57F1E4F-1CFF-5643-939E-217C01CDF565}" type="slidenum">
-              <a:rPr lang="en-US" dirty="0"/>
+              <a:rPr lang="en-US"/>
               <a:pPr/>
               <a:t>‹#›</a:t>
             </a:fld>
@@ -1335,9 +1335,9 @@
           <a:lstStyle/>
           <a:p>
             <a:fld id="{B61BEF0D-F0BB-DE4B-95CE-6DB70DBA9567}" type="datetimeFigureOut">
-              <a:rPr lang="en-US" dirty="0"/>
+              <a:rPr lang="en-US"/>
               <a:pPr/>
-              <a:t>11/16/19</a:t>
+              <a:t>12/6/19</a:t>
             </a:fld>
             <a:endParaRPr lang="en-US" dirty="0"/>
           </a:p>
@@ -1378,7 +1378,7 @@
           <a:lstStyle/>
           <a:p>
             <a:fld id="{D57F1E4F-1CFF-5643-939E-217C01CDF565}" type="slidenum">
-              <a:rPr lang="en-US" dirty="0"/>
+              <a:rPr lang="en-US"/>
               <a:pPr/>
               <a:t>‹#›</a:t>
             </a:fld>
@@ -1512,9 +1512,9 @@
           <a:lstStyle/>
           <a:p>
             <a:fld id="{B61BEF0D-F0BB-DE4B-95CE-6DB70DBA9567}" type="datetimeFigureOut">
-              <a:rPr lang="en-US" dirty="0"/>
+              <a:rPr lang="en-US"/>
               <a:pPr/>
-              <a:t>11/16/19</a:t>
+              <a:t>12/6/19</a:t>
             </a:fld>
             <a:endParaRPr lang="en-US" dirty="0"/>
           </a:p>
@@ -1555,7 +1555,7 @@
           <a:lstStyle/>
           <a:p>
             <a:fld id="{D57F1E4F-1CFF-5643-939E-217C01CDF565}" type="slidenum">
-              <a:rPr lang="en-US" dirty="0"/>
+              <a:rPr lang="en-US"/>
               <a:pPr/>
               <a:t>‹#›</a:t>
             </a:fld>
@@ -2085,9 +2085,9 @@
           <a:lstStyle/>
           <a:p>
             <a:fld id="{B61BEF0D-F0BB-DE4B-95CE-6DB70DBA9567}" type="datetimeFigureOut">
-              <a:rPr lang="en-US" dirty="0"/>
+              <a:rPr lang="en-US"/>
               <a:pPr/>
-              <a:t>11/16/19</a:t>
+              <a:t>12/6/19</a:t>
             </a:fld>
             <a:endParaRPr lang="en-US" dirty="0"/>
           </a:p>
@@ -2128,7 +2128,7 @@
           <a:lstStyle/>
           <a:p>
             <a:fld id="{D57F1E4F-1CFF-5643-939E-217C01CDF565}" type="slidenum">
-              <a:rPr lang="en-US" dirty="0"/>
+              <a:rPr lang="en-US"/>
               <a:pPr/>
               <a:t>‹#›</a:t>
             </a:fld>
@@ -2414,9 +2414,9 @@
           <a:lstStyle/>
           <a:p>
             <a:fld id="{B61BEF0D-F0BB-DE4B-95CE-6DB70DBA9567}" type="datetimeFigureOut">
-              <a:rPr lang="en-US" dirty="0"/>
+              <a:rPr lang="en-US"/>
               <a:pPr/>
-              <a:t>11/16/19</a:t>
+              <a:t>12/6/19</a:t>
             </a:fld>
             <a:endParaRPr lang="en-US" dirty="0"/>
           </a:p>
@@ -2457,7 +2457,7 @@
           <a:lstStyle/>
           <a:p>
             <a:fld id="{D57F1E4F-1CFF-5643-939E-217C01CDF565}" type="slidenum">
-              <a:rPr lang="en-US" dirty="0"/>
+              <a:rPr lang="en-US"/>
               <a:pPr/>
               <a:t>‹#›</a:t>
             </a:fld>
@@ -2586,9 +2586,9 @@
           <a:lstStyle/>
           <a:p>
             <a:fld id="{B61BEF0D-F0BB-DE4B-95CE-6DB70DBA9567}" type="datetimeFigureOut">
-              <a:rPr lang="en-US" dirty="0"/>
+              <a:rPr lang="en-US"/>
               <a:pPr/>
-              <a:t>11/16/19</a:t>
+              <a:t>12/6/19</a:t>
             </a:fld>
             <a:endParaRPr lang="en-US" dirty="0"/>
           </a:p>
@@ -2629,7 +2629,7 @@
           <a:lstStyle/>
           <a:p>
             <a:fld id="{D57F1E4F-1CFF-5643-939E-217C01CDF565}" type="slidenum">
-              <a:rPr lang="en-US" dirty="0"/>
+              <a:rPr lang="en-US"/>
               <a:pPr/>
               <a:t>‹#›</a:t>
             </a:fld>
@@ -2763,9 +2763,9 @@
           <a:lstStyle/>
           <a:p>
             <a:fld id="{B61BEF0D-F0BB-DE4B-95CE-6DB70DBA9567}" type="datetimeFigureOut">
-              <a:rPr lang="en-US" dirty="0"/>
+              <a:rPr lang="en-US"/>
               <a:pPr/>
-              <a:t>11/16/19</a:t>
+              <a:t>12/6/19</a:t>
             </a:fld>
             <a:endParaRPr lang="en-US" dirty="0"/>
           </a:p>
@@ -2806,7 +2806,7 @@
           <a:lstStyle/>
           <a:p>
             <a:fld id="{D57F1E4F-1CFF-5643-939E-217C01CDF565}" type="slidenum">
-              <a:rPr lang="en-US" dirty="0"/>
+              <a:rPr lang="en-US"/>
               <a:pPr/>
               <a:t>‹#›</a:t>
             </a:fld>
@@ -2930,9 +2930,9 @@
           <a:lstStyle/>
           <a:p>
             <a:fld id="{B61BEF0D-F0BB-DE4B-95CE-6DB70DBA9567}" type="datetimeFigureOut">
-              <a:rPr lang="en-US" dirty="0"/>
+              <a:rPr lang="en-US"/>
               <a:pPr/>
-              <a:t>11/16/19</a:t>
+              <a:t>12/6/19</a:t>
             </a:fld>
             <a:endParaRPr lang="en-US" dirty="0"/>
           </a:p>
@@ -2973,7 +2973,7 @@
           <a:lstStyle/>
           <a:p>
             <a:fld id="{D57F1E4F-1CFF-5643-939E-217C01CDF565}" type="slidenum">
-              <a:rPr lang="en-US" dirty="0"/>
+              <a:rPr lang="en-US"/>
               <a:pPr/>
               <a:t>‹#›</a:t>
             </a:fld>
@@ -3184,9 +3184,9 @@
           <a:lstStyle/>
           <a:p>
             <a:fld id="{B61BEF0D-F0BB-DE4B-95CE-6DB70DBA9567}" type="datetimeFigureOut">
-              <a:rPr lang="en-US" dirty="0"/>
+              <a:rPr lang="en-US"/>
               <a:pPr/>
-              <a:t>11/16/19</a:t>
+              <a:t>12/6/19</a:t>
             </a:fld>
             <a:endParaRPr lang="en-US" dirty="0"/>
           </a:p>
@@ -3227,7 +3227,7 @@
           <a:lstStyle/>
           <a:p>
             <a:fld id="{D57F1E4F-1CFF-5643-939E-217C01CDF565}" type="slidenum">
-              <a:rPr lang="en-US" dirty="0"/>
+              <a:rPr lang="en-US"/>
               <a:pPr/>
               <a:t>‹#›</a:t>
             </a:fld>
@@ -3473,9 +3473,9 @@
           <a:lstStyle/>
           <a:p>
             <a:fld id="{B61BEF0D-F0BB-DE4B-95CE-6DB70DBA9567}" type="datetimeFigureOut">
-              <a:rPr lang="en-US" dirty="0"/>
+              <a:rPr lang="en-US"/>
               <a:pPr/>
-              <a:t>11/16/19</a:t>
+              <a:t>12/6/19</a:t>
             </a:fld>
             <a:endParaRPr lang="en-US" dirty="0"/>
           </a:p>
@@ -3516,7 +3516,7 @@
           <a:lstStyle/>
           <a:p>
             <a:fld id="{D57F1E4F-1CFF-5643-939E-217C01CDF565}" type="slidenum">
-              <a:rPr lang="en-US" dirty="0"/>
+              <a:rPr lang="en-US"/>
               <a:pPr/>
               <a:t>‹#›</a:t>
             </a:fld>
@@ -3900,9 +3900,9 @@
           <a:lstStyle/>
           <a:p>
             <a:fld id="{B61BEF0D-F0BB-DE4B-95CE-6DB70DBA9567}" type="datetimeFigureOut">
-              <a:rPr lang="en-US" dirty="0"/>
+              <a:rPr lang="en-US"/>
               <a:pPr/>
-              <a:t>11/16/19</a:t>
+              <a:t>12/6/19</a:t>
             </a:fld>
             <a:endParaRPr lang="en-US" dirty="0"/>
           </a:p>
@@ -3943,7 +3943,7 @@
           <a:lstStyle/>
           <a:p>
             <a:fld id="{D57F1E4F-1CFF-5643-939E-217C01CDF565}" type="slidenum">
-              <a:rPr lang="en-US" dirty="0"/>
+              <a:rPr lang="en-US"/>
               <a:pPr/>
               <a:t>‹#›</a:t>
             </a:fld>
@@ -4015,9 +4015,9 @@
           <a:lstStyle/>
           <a:p>
             <a:fld id="{B61BEF0D-F0BB-DE4B-95CE-6DB70DBA9567}" type="datetimeFigureOut">
-              <a:rPr lang="en-US" dirty="0"/>
+              <a:rPr lang="en-US"/>
               <a:pPr/>
-              <a:t>11/16/19</a:t>
+              <a:t>12/6/19</a:t>
             </a:fld>
             <a:endParaRPr lang="en-US" dirty="0"/>
           </a:p>
@@ -4058,7 +4058,7 @@
           <a:lstStyle/>
           <a:p>
             <a:fld id="{D57F1E4F-1CFF-5643-939E-217C01CDF565}" type="slidenum">
-              <a:rPr lang="en-US" dirty="0"/>
+              <a:rPr lang="en-US"/>
               <a:pPr/>
               <a:t>‹#›</a:t>
             </a:fld>
@@ -4107,9 +4107,9 @@
           <a:lstStyle/>
           <a:p>
             <a:fld id="{B61BEF0D-F0BB-DE4B-95CE-6DB70DBA9567}" type="datetimeFigureOut">
-              <a:rPr lang="en-US" dirty="0"/>
+              <a:rPr lang="en-US"/>
               <a:pPr/>
-              <a:t>11/16/19</a:t>
+              <a:t>12/6/19</a:t>
             </a:fld>
             <a:endParaRPr lang="en-US" dirty="0"/>
           </a:p>
@@ -4150,7 +4150,7 @@
           <a:lstStyle/>
           <a:p>
             <a:fld id="{D57F1E4F-1CFF-5643-939E-217C01CDF565}" type="slidenum">
-              <a:rPr lang="en-US" dirty="0"/>
+              <a:rPr lang="en-US"/>
               <a:pPr/>
               <a:t>‹#›</a:t>
             </a:fld>
@@ -4387,9 +4387,9 @@
           <a:lstStyle/>
           <a:p>
             <a:fld id="{B61BEF0D-F0BB-DE4B-95CE-6DB70DBA9567}" type="datetimeFigureOut">
-              <a:rPr lang="en-US" dirty="0"/>
+              <a:rPr lang="en-US"/>
               <a:pPr/>
-              <a:t>11/16/19</a:t>
+              <a:t>12/6/19</a:t>
             </a:fld>
             <a:endParaRPr lang="en-US" dirty="0"/>
           </a:p>
@@ -4430,7 +4430,7 @@
           <a:lstStyle/>
           <a:p>
             <a:fld id="{D57F1E4F-1CFF-5643-939E-217C01CDF565}" type="slidenum">
-              <a:rPr lang="en-US" dirty="0"/>
+              <a:rPr lang="en-US"/>
               <a:pPr/>
               <a:t>‹#›</a:t>
             </a:fld>
@@ -4580,10 +4580,9 @@
           </a:lstStyle>
           <a:p>
             <a:r>
-              <a:rPr lang="en-US"/>
+              <a:rPr lang="en-US" dirty="0"/>
               <a:t>Click icon to add picture</a:t>
             </a:r>
-            <a:endParaRPr lang="en-US" dirty="0"/>
           </a:p>
         </p:txBody>
       </p:sp>
@@ -4675,9 +4674,9 @@
           <a:lstStyle/>
           <a:p>
             <a:fld id="{B61BEF0D-F0BB-DE4B-95CE-6DB70DBA9567}" type="datetimeFigureOut">
-              <a:rPr lang="en-US" dirty="0"/>
+              <a:rPr lang="en-US"/>
               <a:pPr/>
-              <a:t>11/16/19</a:t>
+              <a:t>12/6/19</a:t>
             </a:fld>
             <a:endParaRPr lang="en-US" dirty="0"/>
           </a:p>
@@ -4728,7 +4727,7 @@
           <a:lstStyle/>
           <a:p>
             <a:fld id="{D57F1E4F-1CFF-5643-939E-217C01CDF565}" type="slidenum">
-              <a:rPr lang="en-US" dirty="0"/>
+              <a:rPr lang="en-US"/>
               <a:pPr/>
               <a:t>‹#›</a:t>
             </a:fld>
@@ -4903,9 +4902,9 @@
           </a:lstStyle>
           <a:p>
             <a:fld id="{B61BEF0D-F0BB-DE4B-95CE-6DB70DBA9567}" type="datetimeFigureOut">
-              <a:rPr lang="en-US" dirty="0"/>
+              <a:rPr lang="en-US"/>
               <a:pPr/>
-              <a:t>11/16/19</a:t>
+              <a:t>12/6/19</a:t>
             </a:fld>
             <a:endParaRPr lang="en-US" dirty="0"/>
           </a:p>
@@ -4998,7 +4997,7 @@
           </a:lstStyle>
           <a:p>
             <a:fld id="{D57F1E4F-1CFF-5643-939E-217C01CDF565}" type="slidenum">
-              <a:rPr lang="en-US" dirty="0"/>
+              <a:rPr lang="en-US"/>
               <a:pPr/>
               <a:t>‹#›</a:t>
             </a:fld>
@@ -6020,6 +6019,2696 @@
 </p:sld>
 </file>
 
+<file path=ppt/slides/slide3.xml><?xml version="1.0" encoding="utf-8"?>
+<p:sld xmlns:a="http://schemas.openxmlformats.org/drawingml/2006/main" xmlns:r="http://schemas.openxmlformats.org/officeDocument/2006/relationships" xmlns:p="http://schemas.openxmlformats.org/presentationml/2006/main">
+  <p:cSld>
+    <p:spTree>
+      <p:nvGrpSpPr>
+        <p:cNvPr id="1" name=""/>
+        <p:cNvGrpSpPr/>
+        <p:nvPr/>
+      </p:nvGrpSpPr>
+      <p:grpSpPr>
+        <a:xfrm>
+          <a:off x="0" y="0"/>
+          <a:ext cx="0" cy="0"/>
+          <a:chOff x="0" y="0"/>
+          <a:chExt cx="0" cy="0"/>
+        </a:xfrm>
+      </p:grpSpPr>
+      <p:sp>
+        <p:nvSpPr>
+          <p:cNvPr id="2" name="TextBox 1">
+            <a:extLst>
+              <a:ext uri="{FF2B5EF4-FFF2-40B4-BE49-F238E27FC236}">
+                <a16:creationId xmlns:a16="http://schemas.microsoft.com/office/drawing/2014/main" id="{D649F649-5D4F-7149-B7D2-6ADDB63ABED6}"/>
+              </a:ext>
+            </a:extLst>
+          </p:cNvPr>
+          <p:cNvSpPr txBox="1"/>
+          <p:nvPr/>
+        </p:nvSpPr>
+        <p:spPr>
+          <a:xfrm>
+            <a:off x="486383" y="233464"/>
+            <a:ext cx="11138170" cy="6429983"/>
+          </a:xfrm>
+          <a:prstGeom prst="rect">
+            <a:avLst/>
+          </a:prstGeom>
+          <a:solidFill>
+            <a:schemeClr val="tx1">
+              <a:lumMod val="95000"/>
+            </a:schemeClr>
+          </a:solidFill>
+        </p:spPr>
+        <p:txBody>
+          <a:bodyPr wrap="square" lIns="457200" tIns="457200" rIns="457200" bIns="457200" rtlCol="0">
+            <a:normAutofit/>
+          </a:bodyPr>
+          <a:lstStyle/>
+          <a:p>
+            <a:r>
+              <a:rPr lang="en-US" dirty="0" err="1">
+                <a:solidFill>
+                  <a:schemeClr val="bg1"/>
+                </a:solidFill>
+              </a:rPr>
+              <a:t>Unet</a:t>
+            </a:r>
+            <a:r>
+              <a:rPr lang="en-US" dirty="0">
+                <a:solidFill>
+                  <a:schemeClr val="bg1"/>
+                </a:solidFill>
+              </a:rPr>
+              <a:t> Architecture with Resnet Encoder</a:t>
+            </a:r>
+          </a:p>
+          <a:p>
+            <a:endParaRPr lang="en-US" dirty="0">
+              <a:solidFill>
+                <a:schemeClr val="bg1"/>
+              </a:solidFill>
+            </a:endParaRPr>
+          </a:p>
+        </p:txBody>
+      </p:sp>
+      <p:pic>
+        <p:nvPicPr>
+          <p:cNvPr id="4" name="Picture 3">
+            <a:extLst>
+              <a:ext uri="{FF2B5EF4-FFF2-40B4-BE49-F238E27FC236}">
+                <a16:creationId xmlns:a16="http://schemas.microsoft.com/office/drawing/2014/main" id="{2A6DB49F-A96D-2E42-BB9C-4FEFF469C322}"/>
+              </a:ext>
+            </a:extLst>
+          </p:cNvPr>
+          <p:cNvPicPr>
+            <a:picLocks noChangeAspect="1"/>
+          </p:cNvPicPr>
+          <p:nvPr/>
+        </p:nvPicPr>
+        <p:blipFill>
+          <a:blip r:embed="rId2"/>
+          <a:stretch>
+            <a:fillRect/>
+          </a:stretch>
+        </p:blipFill>
+        <p:spPr>
+          <a:xfrm>
+            <a:off x="2889113" y="1122082"/>
+            <a:ext cx="8094881" cy="5262233"/>
+          </a:xfrm>
+          <a:prstGeom prst="rect">
+            <a:avLst/>
+          </a:prstGeom>
+        </p:spPr>
+      </p:pic>
+      <p:grpSp>
+        <p:nvGrpSpPr>
+          <p:cNvPr id="19" name="Group 18">
+            <a:extLst>
+              <a:ext uri="{FF2B5EF4-FFF2-40B4-BE49-F238E27FC236}">
+                <a16:creationId xmlns:a16="http://schemas.microsoft.com/office/drawing/2014/main" id="{A4A3B006-6B0F-0547-A3AB-8B5E57EA54CF}"/>
+              </a:ext>
+            </a:extLst>
+          </p:cNvPr>
+          <p:cNvGrpSpPr/>
+          <p:nvPr/>
+        </p:nvGrpSpPr>
+        <p:grpSpPr>
+          <a:xfrm>
+            <a:off x="2889113" y="1122082"/>
+            <a:ext cx="5732121" cy="5130437"/>
+            <a:chOff x="2889113" y="1122082"/>
+            <a:chExt cx="5732121" cy="5130437"/>
+          </a:xfrm>
+        </p:grpSpPr>
+        <p:grpSp>
+          <p:nvGrpSpPr>
+            <p:cNvPr id="8" name="Group 7">
+              <a:extLst>
+                <a:ext uri="{FF2B5EF4-FFF2-40B4-BE49-F238E27FC236}">
+                  <a16:creationId xmlns:a16="http://schemas.microsoft.com/office/drawing/2014/main" id="{1A02F18D-F4DD-FA46-BF69-652433E6A5A0}"/>
+                </a:ext>
+              </a:extLst>
+            </p:cNvPr>
+            <p:cNvGrpSpPr/>
+            <p:nvPr/>
+          </p:nvGrpSpPr>
+          <p:grpSpPr>
+            <a:xfrm>
+              <a:off x="2889113" y="1122082"/>
+              <a:ext cx="3893751" cy="5130437"/>
+              <a:chOff x="2889113" y="1122082"/>
+              <a:chExt cx="3893751" cy="5130437"/>
+            </a:xfrm>
+          </p:grpSpPr>
+          <p:sp>
+            <p:nvSpPr>
+              <p:cNvPr id="5" name="TextBox 4">
+                <a:extLst>
+                  <a:ext uri="{FF2B5EF4-FFF2-40B4-BE49-F238E27FC236}">
+                    <a16:creationId xmlns:a16="http://schemas.microsoft.com/office/drawing/2014/main" id="{AF81062A-DB17-E743-8A4B-CDBD548F31A3}"/>
+                  </a:ext>
+                </a:extLst>
+              </p:cNvPr>
+              <p:cNvSpPr txBox="1"/>
+              <p:nvPr/>
+            </p:nvSpPr>
+            <p:spPr>
+              <a:xfrm>
+                <a:off x="2889113" y="1122082"/>
+                <a:ext cx="3635255" cy="5068653"/>
+              </a:xfrm>
+              <a:prstGeom prst="rect">
+                <a:avLst/>
+              </a:prstGeom>
+              <a:solidFill>
+                <a:schemeClr val="tx1"/>
+              </a:solidFill>
+            </p:spPr>
+            <p:txBody>
+              <a:bodyPr wrap="square" rtlCol="0">
+                <a:spAutoFit/>
+              </a:bodyPr>
+              <a:lstStyle/>
+              <a:p>
+                <a:endParaRPr lang="en-US"/>
+              </a:p>
+            </p:txBody>
+          </p:sp>
+          <p:sp>
+            <p:nvSpPr>
+              <p:cNvPr id="7" name="TextBox 6">
+                <a:extLst>
+                  <a:ext uri="{FF2B5EF4-FFF2-40B4-BE49-F238E27FC236}">
+                    <a16:creationId xmlns:a16="http://schemas.microsoft.com/office/drawing/2014/main" id="{E24CC4BC-44AA-8745-A4A8-4CD38036EA1C}"/>
+                  </a:ext>
+                </a:extLst>
+              </p:cNvPr>
+              <p:cNvSpPr txBox="1"/>
+              <p:nvPr/>
+            </p:nvSpPr>
+            <p:spPr>
+              <a:xfrm>
+                <a:off x="5745893" y="5809741"/>
+                <a:ext cx="1036971" cy="442778"/>
+              </a:xfrm>
+              <a:prstGeom prst="rect">
+                <a:avLst/>
+              </a:prstGeom>
+              <a:solidFill>
+                <a:schemeClr val="tx1"/>
+              </a:solidFill>
+            </p:spPr>
+            <p:txBody>
+              <a:bodyPr wrap="square" rtlCol="0">
+                <a:spAutoFit/>
+              </a:bodyPr>
+              <a:lstStyle/>
+              <a:p>
+                <a:endParaRPr lang="en-US"/>
+              </a:p>
+            </p:txBody>
+          </p:sp>
+        </p:grpSp>
+        <p:sp>
+          <p:nvSpPr>
+            <p:cNvPr id="15" name="TextBox 14">
+              <a:extLst>
+                <a:ext uri="{FF2B5EF4-FFF2-40B4-BE49-F238E27FC236}">
+                  <a16:creationId xmlns:a16="http://schemas.microsoft.com/office/drawing/2014/main" id="{45D06536-D57B-C741-AD17-34731B174E25}"/>
+                </a:ext>
+              </a:extLst>
+            </p:cNvPr>
+            <p:cNvSpPr txBox="1"/>
+            <p:nvPr/>
+          </p:nvSpPr>
+          <p:spPr>
+            <a:xfrm>
+              <a:off x="6446445" y="2011688"/>
+              <a:ext cx="2174789" cy="398108"/>
+            </a:xfrm>
+            <a:prstGeom prst="rect">
+              <a:avLst/>
+            </a:prstGeom>
+            <a:solidFill>
+              <a:schemeClr val="tx1"/>
+            </a:solidFill>
+          </p:spPr>
+          <p:txBody>
+            <a:bodyPr wrap="square" rtlCol="0">
+              <a:spAutoFit/>
+            </a:bodyPr>
+            <a:lstStyle/>
+            <a:p>
+              <a:endParaRPr lang="en-US"/>
+            </a:p>
+          </p:txBody>
+        </p:sp>
+        <p:sp>
+          <p:nvSpPr>
+            <p:cNvPr id="16" name="TextBox 15">
+              <a:extLst>
+                <a:ext uri="{FF2B5EF4-FFF2-40B4-BE49-F238E27FC236}">
+                  <a16:creationId xmlns:a16="http://schemas.microsoft.com/office/drawing/2014/main" id="{E6EEAFAA-8A6A-E041-BE3A-BF7BDF9C21B7}"/>
+                </a:ext>
+              </a:extLst>
+            </p:cNvPr>
+            <p:cNvSpPr txBox="1"/>
+            <p:nvPr/>
+          </p:nvSpPr>
+          <p:spPr>
+            <a:xfrm>
+              <a:off x="5943937" y="3799893"/>
+              <a:ext cx="2174789" cy="398108"/>
+            </a:xfrm>
+            <a:prstGeom prst="rect">
+              <a:avLst/>
+            </a:prstGeom>
+            <a:solidFill>
+              <a:schemeClr val="tx1"/>
+            </a:solidFill>
+          </p:spPr>
+          <p:txBody>
+            <a:bodyPr wrap="square" rtlCol="0">
+              <a:spAutoFit/>
+            </a:bodyPr>
+            <a:lstStyle/>
+            <a:p>
+              <a:endParaRPr lang="en-US"/>
+            </a:p>
+          </p:txBody>
+        </p:sp>
+        <p:sp>
+          <p:nvSpPr>
+            <p:cNvPr id="17" name="TextBox 16">
+              <a:extLst>
+                <a:ext uri="{FF2B5EF4-FFF2-40B4-BE49-F238E27FC236}">
+                  <a16:creationId xmlns:a16="http://schemas.microsoft.com/office/drawing/2014/main" id="{F56ADF8A-6664-5540-B7BC-38AAB42F1FB2}"/>
+                </a:ext>
+              </a:extLst>
+            </p:cNvPr>
+            <p:cNvSpPr txBox="1"/>
+            <p:nvPr/>
+          </p:nvSpPr>
+          <p:spPr>
+            <a:xfrm>
+              <a:off x="6214938" y="4718063"/>
+              <a:ext cx="1135852" cy="398108"/>
+            </a:xfrm>
+            <a:prstGeom prst="rect">
+              <a:avLst/>
+            </a:prstGeom>
+            <a:solidFill>
+              <a:schemeClr val="tx1"/>
+            </a:solidFill>
+          </p:spPr>
+          <p:txBody>
+            <a:bodyPr wrap="square" rtlCol="0">
+              <a:spAutoFit/>
+            </a:bodyPr>
+            <a:lstStyle/>
+            <a:p>
+              <a:endParaRPr lang="en-US"/>
+            </a:p>
+          </p:txBody>
+        </p:sp>
+      </p:grpSp>
+      <p:cxnSp>
+        <p:nvCxnSpPr>
+          <p:cNvPr id="39" name="Straight Arrow Connector 38">
+            <a:extLst>
+              <a:ext uri="{FF2B5EF4-FFF2-40B4-BE49-F238E27FC236}">
+                <a16:creationId xmlns:a16="http://schemas.microsoft.com/office/drawing/2014/main" id="{5F97F2DF-4AEF-3443-84A6-347DF69DEAC1}"/>
+              </a:ext>
+            </a:extLst>
+          </p:cNvPr>
+          <p:cNvCxnSpPr>
+            <a:cxnSpLocks/>
+          </p:cNvCxnSpPr>
+          <p:nvPr/>
+        </p:nvCxnSpPr>
+        <p:spPr>
+          <a:xfrm>
+            <a:off x="4329319" y="2926821"/>
+            <a:ext cx="0" cy="414011"/>
+          </a:xfrm>
+          <a:prstGeom prst="straightConnector1">
+            <a:avLst/>
+          </a:prstGeom>
+          <a:ln w="50800">
+            <a:solidFill>
+              <a:schemeClr val="accent1">
+                <a:lumMod val="40000"/>
+                <a:lumOff val="60000"/>
+              </a:schemeClr>
+            </a:solidFill>
+            <a:tailEnd type="triangle"/>
+          </a:ln>
+        </p:spPr>
+        <p:style>
+          <a:lnRef idx="1">
+            <a:schemeClr val="accent1"/>
+          </a:lnRef>
+          <a:fillRef idx="0">
+            <a:schemeClr val="accent1"/>
+          </a:fillRef>
+          <a:effectRef idx="0">
+            <a:schemeClr val="accent1"/>
+          </a:effectRef>
+          <a:fontRef idx="minor">
+            <a:schemeClr val="tx1"/>
+          </a:fontRef>
+        </p:style>
+      </p:cxnSp>
+      <p:cxnSp>
+        <p:nvCxnSpPr>
+          <p:cNvPr id="42" name="Straight Arrow Connector 41">
+            <a:extLst>
+              <a:ext uri="{FF2B5EF4-FFF2-40B4-BE49-F238E27FC236}">
+                <a16:creationId xmlns:a16="http://schemas.microsoft.com/office/drawing/2014/main" id="{8B43EB57-8545-AE47-970C-7F2BCA22D2D0}"/>
+              </a:ext>
+            </a:extLst>
+          </p:cNvPr>
+          <p:cNvCxnSpPr>
+            <a:cxnSpLocks/>
+          </p:cNvCxnSpPr>
+          <p:nvPr/>
+        </p:nvCxnSpPr>
+        <p:spPr>
+          <a:xfrm>
+            <a:off x="4321078" y="3697063"/>
+            <a:ext cx="0" cy="414011"/>
+          </a:xfrm>
+          <a:prstGeom prst="straightConnector1">
+            <a:avLst/>
+          </a:prstGeom>
+          <a:ln w="50800">
+            <a:solidFill>
+              <a:schemeClr val="accent1">
+                <a:lumMod val="40000"/>
+                <a:lumOff val="60000"/>
+              </a:schemeClr>
+            </a:solidFill>
+            <a:tailEnd type="triangle"/>
+          </a:ln>
+        </p:spPr>
+        <p:style>
+          <a:lnRef idx="1">
+            <a:schemeClr val="accent1"/>
+          </a:lnRef>
+          <a:fillRef idx="0">
+            <a:schemeClr val="accent1"/>
+          </a:fillRef>
+          <a:effectRef idx="0">
+            <a:schemeClr val="accent1"/>
+          </a:effectRef>
+          <a:fontRef idx="minor">
+            <a:schemeClr val="tx1"/>
+          </a:fontRef>
+        </p:style>
+      </p:cxnSp>
+      <p:cxnSp>
+        <p:nvCxnSpPr>
+          <p:cNvPr id="43" name="Straight Arrow Connector 42">
+            <a:extLst>
+              <a:ext uri="{FF2B5EF4-FFF2-40B4-BE49-F238E27FC236}">
+                <a16:creationId xmlns:a16="http://schemas.microsoft.com/office/drawing/2014/main" id="{E7663ADE-E7E5-364A-AFCD-245D997BB81C}"/>
+              </a:ext>
+            </a:extLst>
+          </p:cNvPr>
+          <p:cNvCxnSpPr>
+            <a:cxnSpLocks/>
+          </p:cNvCxnSpPr>
+          <p:nvPr/>
+        </p:nvCxnSpPr>
+        <p:spPr>
+          <a:xfrm>
+            <a:off x="4337552" y="4492017"/>
+            <a:ext cx="0" cy="414011"/>
+          </a:xfrm>
+          <a:prstGeom prst="straightConnector1">
+            <a:avLst/>
+          </a:prstGeom>
+          <a:ln w="50800">
+            <a:solidFill>
+              <a:schemeClr val="accent1">
+                <a:lumMod val="40000"/>
+                <a:lumOff val="60000"/>
+              </a:schemeClr>
+            </a:solidFill>
+            <a:tailEnd type="triangle"/>
+          </a:ln>
+        </p:spPr>
+        <p:style>
+          <a:lnRef idx="1">
+            <a:schemeClr val="accent1"/>
+          </a:lnRef>
+          <a:fillRef idx="0">
+            <a:schemeClr val="accent1"/>
+          </a:fillRef>
+          <a:effectRef idx="0">
+            <a:schemeClr val="accent1"/>
+          </a:effectRef>
+          <a:fontRef idx="minor">
+            <a:schemeClr val="tx1"/>
+          </a:fontRef>
+        </p:style>
+      </p:cxnSp>
+      <p:cxnSp>
+        <p:nvCxnSpPr>
+          <p:cNvPr id="44" name="Straight Arrow Connector 43">
+            <a:extLst>
+              <a:ext uri="{FF2B5EF4-FFF2-40B4-BE49-F238E27FC236}">
+                <a16:creationId xmlns:a16="http://schemas.microsoft.com/office/drawing/2014/main" id="{5B58E10A-7BBD-CA4C-BB58-8F7FFA821152}"/>
+              </a:ext>
+            </a:extLst>
+          </p:cNvPr>
+          <p:cNvCxnSpPr>
+            <a:cxnSpLocks/>
+          </p:cNvCxnSpPr>
+          <p:nvPr/>
+        </p:nvCxnSpPr>
+        <p:spPr>
+          <a:xfrm>
+            <a:off x="4341669" y="5237543"/>
+            <a:ext cx="0" cy="414011"/>
+          </a:xfrm>
+          <a:prstGeom prst="straightConnector1">
+            <a:avLst/>
+          </a:prstGeom>
+          <a:ln w="50800">
+            <a:solidFill>
+              <a:schemeClr val="accent1">
+                <a:lumMod val="40000"/>
+                <a:lumOff val="60000"/>
+              </a:schemeClr>
+            </a:solidFill>
+            <a:tailEnd type="triangle"/>
+          </a:ln>
+        </p:spPr>
+        <p:style>
+          <a:lnRef idx="1">
+            <a:schemeClr val="accent1"/>
+          </a:lnRef>
+          <a:fillRef idx="0">
+            <a:schemeClr val="accent1"/>
+          </a:fillRef>
+          <a:effectRef idx="0">
+            <a:schemeClr val="accent1"/>
+          </a:effectRef>
+          <a:fontRef idx="minor">
+            <a:schemeClr val="tx1"/>
+          </a:fontRef>
+        </p:style>
+      </p:cxnSp>
+      <p:sp>
+        <p:nvSpPr>
+          <p:cNvPr id="6" name="TextBox 5">
+            <a:extLst>
+              <a:ext uri="{FF2B5EF4-FFF2-40B4-BE49-F238E27FC236}">
+                <a16:creationId xmlns:a16="http://schemas.microsoft.com/office/drawing/2014/main" id="{A2594E8A-110F-9644-960F-E80909F3EEFD}"/>
+              </a:ext>
+            </a:extLst>
+          </p:cNvPr>
+          <p:cNvSpPr txBox="1"/>
+          <p:nvPr/>
+        </p:nvSpPr>
+        <p:spPr>
+          <a:xfrm>
+            <a:off x="758757" y="1122083"/>
+            <a:ext cx="2042809" cy="5262232"/>
+          </a:xfrm>
+          <a:prstGeom prst="rect">
+            <a:avLst/>
+          </a:prstGeom>
+          <a:solidFill>
+            <a:schemeClr val="tx1"/>
+          </a:solidFill>
+        </p:spPr>
+        <p:txBody>
+          <a:bodyPr wrap="square" rtlCol="0">
+            <a:noAutofit/>
+          </a:bodyPr>
+          <a:lstStyle/>
+          <a:p>
+            <a:r>
+              <a:rPr lang="en-US" b="1" dirty="0">
+                <a:solidFill>
+                  <a:schemeClr val="bg1"/>
+                </a:solidFill>
+              </a:rPr>
+              <a:t>Build Steps:</a:t>
+            </a:r>
+          </a:p>
+          <a:p>
+            <a:pPr marL="342900" indent="-342900">
+              <a:spcBef>
+                <a:spcPts val="600"/>
+              </a:spcBef>
+              <a:buAutoNum type="arabicPeriod"/>
+            </a:pPr>
+            <a:r>
+              <a:rPr lang="en-US" dirty="0">
+                <a:solidFill>
+                  <a:schemeClr val="bg1"/>
+                </a:solidFill>
+              </a:rPr>
+              <a:t>Isolate </a:t>
+            </a:r>
+            <a:r>
+              <a:rPr lang="en-US" dirty="0" err="1">
+                <a:solidFill>
+                  <a:schemeClr val="bg1"/>
+                </a:solidFill>
+              </a:rPr>
+              <a:t>Unet</a:t>
+            </a:r>
+            <a:r>
+              <a:rPr lang="en-US" dirty="0">
+                <a:solidFill>
+                  <a:schemeClr val="bg1"/>
+                </a:solidFill>
+              </a:rPr>
+              <a:t> decoder</a:t>
+            </a:r>
+          </a:p>
+          <a:p>
+            <a:pPr marL="342900" indent="-342900">
+              <a:spcBef>
+                <a:spcPts val="600"/>
+              </a:spcBef>
+              <a:buAutoNum type="arabicPeriod"/>
+            </a:pPr>
+            <a:r>
+              <a:rPr lang="en-US" dirty="0">
+                <a:solidFill>
+                  <a:schemeClr val="bg1"/>
+                </a:solidFill>
+              </a:rPr>
+              <a:t>Import Resnet pretrained network</a:t>
+            </a:r>
+          </a:p>
+          <a:p>
+            <a:pPr marL="342900" indent="-342900">
+              <a:spcBef>
+                <a:spcPts val="600"/>
+              </a:spcBef>
+              <a:buAutoNum type="arabicPeriod"/>
+            </a:pPr>
+            <a:r>
+              <a:rPr lang="en-US" dirty="0">
+                <a:solidFill>
+                  <a:schemeClr val="bg1"/>
+                </a:solidFill>
+              </a:rPr>
+              <a:t>Connect Layers</a:t>
+            </a:r>
+          </a:p>
+          <a:p>
+            <a:pPr marL="342900" indent="-342900">
+              <a:spcBef>
+                <a:spcPts val="600"/>
+              </a:spcBef>
+              <a:buAutoNum type="arabicPeriod"/>
+            </a:pPr>
+            <a:r>
+              <a:rPr lang="en-US" dirty="0">
+                <a:solidFill>
+                  <a:schemeClr val="bg1"/>
+                </a:solidFill>
+              </a:rPr>
+              <a:t>Adjust Image scaling for training</a:t>
+            </a:r>
+          </a:p>
+          <a:p>
+            <a:pPr marL="342900" indent="-342900">
+              <a:spcBef>
+                <a:spcPts val="600"/>
+              </a:spcBef>
+              <a:buAutoNum type="arabicPeriod"/>
+            </a:pPr>
+            <a:r>
+              <a:rPr lang="en-US" dirty="0">
+                <a:solidFill>
+                  <a:schemeClr val="bg1"/>
+                </a:solidFill>
+              </a:rPr>
+              <a:t>Train</a:t>
+            </a:r>
+          </a:p>
+          <a:p>
+            <a:pPr marL="342900" indent="-342900">
+              <a:spcBef>
+                <a:spcPts val="600"/>
+              </a:spcBef>
+              <a:buAutoNum type="arabicPeriod"/>
+            </a:pPr>
+            <a:r>
+              <a:rPr lang="en-US" dirty="0">
+                <a:solidFill>
+                  <a:schemeClr val="bg1"/>
+                </a:solidFill>
+              </a:rPr>
+              <a:t>Adjust image scaling for inference</a:t>
+            </a:r>
+          </a:p>
+        </p:txBody>
+      </p:sp>
+      <p:sp>
+        <p:nvSpPr>
+          <p:cNvPr id="46" name="Rectangle 45">
+            <a:extLst>
+              <a:ext uri="{FF2B5EF4-FFF2-40B4-BE49-F238E27FC236}">
+                <a16:creationId xmlns:a16="http://schemas.microsoft.com/office/drawing/2014/main" id="{28BF1324-91B6-2745-985E-94A401252A26}"/>
+              </a:ext>
+            </a:extLst>
+          </p:cNvPr>
+          <p:cNvSpPr/>
+          <p:nvPr/>
+        </p:nvSpPr>
+        <p:spPr>
+          <a:xfrm>
+            <a:off x="2974418" y="1171510"/>
+            <a:ext cx="3018942" cy="5169505"/>
+          </a:xfrm>
+          <a:prstGeom prst="rect">
+            <a:avLst/>
+          </a:prstGeom>
+          <a:solidFill>
+            <a:srgbClr val="F2DDDA">
+              <a:alpha val="60000"/>
+            </a:srgbClr>
+          </a:solidFill>
+          <a:ln>
+            <a:noFill/>
+          </a:ln>
+        </p:spPr>
+        <p:style>
+          <a:lnRef idx="2">
+            <a:schemeClr val="accent1">
+              <a:shade val="50000"/>
+            </a:schemeClr>
+          </a:lnRef>
+          <a:fillRef idx="1">
+            <a:schemeClr val="accent1"/>
+          </a:fillRef>
+          <a:effectRef idx="0">
+            <a:schemeClr val="accent1"/>
+          </a:effectRef>
+          <a:fontRef idx="minor">
+            <a:schemeClr val="lt1"/>
+          </a:fontRef>
+        </p:style>
+        <p:txBody>
+          <a:bodyPr rtlCol="0" anchor="t"/>
+          <a:lstStyle/>
+          <a:p>
+            <a:pPr algn="r"/>
+            <a:r>
+              <a:rPr lang="en-US" dirty="0" err="1">
+                <a:solidFill>
+                  <a:schemeClr val="accent1">
+                    <a:lumMod val="75000"/>
+                  </a:schemeClr>
+                </a:solidFill>
+              </a:rPr>
+              <a:t>ResNet</a:t>
+            </a:r>
+            <a:endParaRPr lang="en-US" dirty="0">
+              <a:solidFill>
+                <a:schemeClr val="accent1">
+                  <a:lumMod val="75000"/>
+                </a:schemeClr>
+              </a:solidFill>
+            </a:endParaRPr>
+          </a:p>
+        </p:txBody>
+      </p:sp>
+      <p:sp>
+        <p:nvSpPr>
+          <p:cNvPr id="9" name="Rectangle 8">
+            <a:extLst>
+              <a:ext uri="{FF2B5EF4-FFF2-40B4-BE49-F238E27FC236}">
+                <a16:creationId xmlns:a16="http://schemas.microsoft.com/office/drawing/2014/main" id="{63B94A15-A455-8248-92F0-E8CC1611D671}"/>
+              </a:ext>
+            </a:extLst>
+          </p:cNvPr>
+          <p:cNvSpPr/>
+          <p:nvPr/>
+        </p:nvSpPr>
+        <p:spPr>
+          <a:xfrm>
+            <a:off x="3160438" y="1354371"/>
+            <a:ext cx="892578" cy="657317"/>
+          </a:xfrm>
+          <a:prstGeom prst="rect">
+            <a:avLst/>
+          </a:prstGeom>
+        </p:spPr>
+        <p:style>
+          <a:lnRef idx="2">
+            <a:schemeClr val="accent1">
+              <a:shade val="50000"/>
+            </a:schemeClr>
+          </a:lnRef>
+          <a:fillRef idx="1">
+            <a:schemeClr val="accent1"/>
+          </a:fillRef>
+          <a:effectRef idx="0">
+            <a:schemeClr val="accent1"/>
+          </a:effectRef>
+          <a:fontRef idx="minor">
+            <a:schemeClr val="lt1"/>
+          </a:fontRef>
+        </p:style>
+        <p:txBody>
+          <a:bodyPr rtlCol="0" anchor="ctr"/>
+          <a:lstStyle/>
+          <a:p>
+            <a:pPr algn="ctr"/>
+            <a:r>
+              <a:rPr lang="en-US" dirty="0"/>
+              <a:t>Input</a:t>
+            </a:r>
+          </a:p>
+        </p:txBody>
+      </p:sp>
+      <p:sp>
+        <p:nvSpPr>
+          <p:cNvPr id="10" name="Rectangle 9">
+            <a:extLst>
+              <a:ext uri="{FF2B5EF4-FFF2-40B4-BE49-F238E27FC236}">
+                <a16:creationId xmlns:a16="http://schemas.microsoft.com/office/drawing/2014/main" id="{887E5844-72D4-F24F-86EF-95300F5F5304}"/>
+              </a:ext>
+            </a:extLst>
+          </p:cNvPr>
+          <p:cNvSpPr/>
+          <p:nvPr/>
+        </p:nvSpPr>
+        <p:spPr>
+          <a:xfrm>
+            <a:off x="3500019" y="2552691"/>
+            <a:ext cx="1631091" cy="494270"/>
+          </a:xfrm>
+          <a:prstGeom prst="rect">
+            <a:avLst/>
+          </a:prstGeom>
+          <a:solidFill>
+            <a:srgbClr val="EEEAF2"/>
+          </a:solidFill>
+          <a:ln w="3175">
+            <a:solidFill>
+              <a:schemeClr val="accent1">
+                <a:lumMod val="60000"/>
+                <a:lumOff val="40000"/>
+              </a:schemeClr>
+            </a:solidFill>
+          </a:ln>
+        </p:spPr>
+        <p:style>
+          <a:lnRef idx="2">
+            <a:schemeClr val="accent1">
+              <a:shade val="50000"/>
+            </a:schemeClr>
+          </a:lnRef>
+          <a:fillRef idx="1">
+            <a:schemeClr val="accent1"/>
+          </a:fillRef>
+          <a:effectRef idx="0">
+            <a:schemeClr val="accent1"/>
+          </a:effectRef>
+          <a:fontRef idx="minor">
+            <a:schemeClr val="lt1"/>
+          </a:fontRef>
+        </p:style>
+        <p:txBody>
+          <a:bodyPr rtlCol="0" anchor="ctr"/>
+          <a:lstStyle/>
+          <a:p>
+            <a:pPr algn="ctr"/>
+            <a:r>
+              <a:rPr lang="en-US">
+                <a:solidFill>
+                  <a:schemeClr val="accent1">
+                    <a:lumMod val="75000"/>
+                  </a:schemeClr>
+                </a:solidFill>
+              </a:rPr>
+              <a:t>Block 1</a:t>
+            </a:r>
+          </a:p>
+        </p:txBody>
+      </p:sp>
+      <p:sp>
+        <p:nvSpPr>
+          <p:cNvPr id="11" name="Rectangle 10">
+            <a:extLst>
+              <a:ext uri="{FF2B5EF4-FFF2-40B4-BE49-F238E27FC236}">
+                <a16:creationId xmlns:a16="http://schemas.microsoft.com/office/drawing/2014/main" id="{28B30636-2672-B943-9F82-4F0BC63A4FE6}"/>
+              </a:ext>
+            </a:extLst>
+          </p:cNvPr>
+          <p:cNvSpPr/>
+          <p:nvPr/>
+        </p:nvSpPr>
+        <p:spPr>
+          <a:xfrm>
+            <a:off x="3500019" y="3340832"/>
+            <a:ext cx="1631091" cy="494270"/>
+          </a:xfrm>
+          <a:prstGeom prst="rect">
+            <a:avLst/>
+          </a:prstGeom>
+          <a:solidFill>
+            <a:srgbClr val="EBF2E0"/>
+          </a:solidFill>
+          <a:ln w="3175">
+            <a:solidFill>
+              <a:schemeClr val="accent1">
+                <a:lumMod val="60000"/>
+                <a:lumOff val="40000"/>
+              </a:schemeClr>
+            </a:solidFill>
+          </a:ln>
+        </p:spPr>
+        <p:style>
+          <a:lnRef idx="2">
+            <a:schemeClr val="accent1">
+              <a:shade val="50000"/>
+            </a:schemeClr>
+          </a:lnRef>
+          <a:fillRef idx="1">
+            <a:schemeClr val="accent1"/>
+          </a:fillRef>
+          <a:effectRef idx="0">
+            <a:schemeClr val="accent1"/>
+          </a:effectRef>
+          <a:fontRef idx="minor">
+            <a:schemeClr val="lt1"/>
+          </a:fontRef>
+        </p:style>
+        <p:txBody>
+          <a:bodyPr rtlCol="0" anchor="ctr"/>
+          <a:lstStyle/>
+          <a:p>
+            <a:pPr algn="ctr"/>
+            <a:r>
+              <a:rPr lang="en-US" dirty="0">
+                <a:solidFill>
+                  <a:schemeClr val="accent1">
+                    <a:lumMod val="75000"/>
+                  </a:schemeClr>
+                </a:solidFill>
+              </a:rPr>
+              <a:t>Block 2</a:t>
+            </a:r>
+          </a:p>
+        </p:txBody>
+      </p:sp>
+      <p:sp>
+        <p:nvSpPr>
+          <p:cNvPr id="12" name="Rectangle 11">
+            <a:extLst>
+              <a:ext uri="{FF2B5EF4-FFF2-40B4-BE49-F238E27FC236}">
+                <a16:creationId xmlns:a16="http://schemas.microsoft.com/office/drawing/2014/main" id="{8BEB9007-6829-274D-A3DF-7667CD7BC17D}"/>
+              </a:ext>
+            </a:extLst>
+          </p:cNvPr>
+          <p:cNvSpPr/>
+          <p:nvPr/>
+        </p:nvSpPr>
+        <p:spPr>
+          <a:xfrm>
+            <a:off x="3500019" y="4128973"/>
+            <a:ext cx="1631091" cy="494270"/>
+          </a:xfrm>
+          <a:prstGeom prst="rect">
+            <a:avLst/>
+          </a:prstGeom>
+          <a:solidFill>
+            <a:srgbClr val="F2DDDA"/>
+          </a:solidFill>
+          <a:ln w="3175">
+            <a:solidFill>
+              <a:schemeClr val="accent1">
+                <a:lumMod val="60000"/>
+                <a:lumOff val="40000"/>
+              </a:schemeClr>
+            </a:solidFill>
+          </a:ln>
+        </p:spPr>
+        <p:style>
+          <a:lnRef idx="2">
+            <a:schemeClr val="accent1">
+              <a:shade val="50000"/>
+            </a:schemeClr>
+          </a:lnRef>
+          <a:fillRef idx="1">
+            <a:schemeClr val="accent1"/>
+          </a:fillRef>
+          <a:effectRef idx="0">
+            <a:schemeClr val="accent1"/>
+          </a:effectRef>
+          <a:fontRef idx="minor">
+            <a:schemeClr val="lt1"/>
+          </a:fontRef>
+        </p:style>
+        <p:txBody>
+          <a:bodyPr rtlCol="0" anchor="ctr"/>
+          <a:lstStyle/>
+          <a:p>
+            <a:pPr algn="ctr"/>
+            <a:r>
+              <a:rPr lang="en-US">
+                <a:solidFill>
+                  <a:schemeClr val="accent1">
+                    <a:lumMod val="75000"/>
+                  </a:schemeClr>
+                </a:solidFill>
+              </a:rPr>
+              <a:t>Block 3</a:t>
+            </a:r>
+          </a:p>
+        </p:txBody>
+      </p:sp>
+      <p:sp>
+        <p:nvSpPr>
+          <p:cNvPr id="13" name="Rectangle 12">
+            <a:extLst>
+              <a:ext uri="{FF2B5EF4-FFF2-40B4-BE49-F238E27FC236}">
+                <a16:creationId xmlns:a16="http://schemas.microsoft.com/office/drawing/2014/main" id="{32078962-81BB-424C-980F-1DBB8FF65DE0}"/>
+              </a:ext>
+            </a:extLst>
+          </p:cNvPr>
+          <p:cNvSpPr/>
+          <p:nvPr/>
+        </p:nvSpPr>
+        <p:spPr>
+          <a:xfrm>
+            <a:off x="3500019" y="4917114"/>
+            <a:ext cx="1631091" cy="494270"/>
+          </a:xfrm>
+          <a:prstGeom prst="rect">
+            <a:avLst/>
+          </a:prstGeom>
+          <a:solidFill>
+            <a:srgbClr val="EAF0F5"/>
+          </a:solidFill>
+          <a:ln w="3175">
+            <a:solidFill>
+              <a:schemeClr val="accent1">
+                <a:lumMod val="60000"/>
+                <a:lumOff val="40000"/>
+              </a:schemeClr>
+            </a:solidFill>
+          </a:ln>
+        </p:spPr>
+        <p:style>
+          <a:lnRef idx="2">
+            <a:schemeClr val="accent1">
+              <a:shade val="50000"/>
+            </a:schemeClr>
+          </a:lnRef>
+          <a:fillRef idx="1">
+            <a:schemeClr val="accent1"/>
+          </a:fillRef>
+          <a:effectRef idx="0">
+            <a:schemeClr val="accent1"/>
+          </a:effectRef>
+          <a:fontRef idx="minor">
+            <a:schemeClr val="lt1"/>
+          </a:fontRef>
+        </p:style>
+        <p:txBody>
+          <a:bodyPr rtlCol="0" anchor="ctr"/>
+          <a:lstStyle/>
+          <a:p>
+            <a:pPr algn="ctr"/>
+            <a:r>
+              <a:rPr lang="en-US" dirty="0">
+                <a:solidFill>
+                  <a:schemeClr val="accent1">
+                    <a:lumMod val="75000"/>
+                  </a:schemeClr>
+                </a:solidFill>
+              </a:rPr>
+              <a:t>Block 4</a:t>
+            </a:r>
+          </a:p>
+        </p:txBody>
+      </p:sp>
+      <p:sp>
+        <p:nvSpPr>
+          <p:cNvPr id="14" name="Rectangle 13">
+            <a:extLst>
+              <a:ext uri="{FF2B5EF4-FFF2-40B4-BE49-F238E27FC236}">
+                <a16:creationId xmlns:a16="http://schemas.microsoft.com/office/drawing/2014/main" id="{ED4090C5-E7D5-174C-A2D8-B821D06A731A}"/>
+              </a:ext>
+            </a:extLst>
+          </p:cNvPr>
+          <p:cNvSpPr/>
+          <p:nvPr/>
+        </p:nvSpPr>
+        <p:spPr>
+          <a:xfrm>
+            <a:off x="3500019" y="5668191"/>
+            <a:ext cx="1631091" cy="494270"/>
+          </a:xfrm>
+          <a:prstGeom prst="rect">
+            <a:avLst/>
+          </a:prstGeom>
+          <a:solidFill>
+            <a:srgbClr val="749ED1"/>
+          </a:solidFill>
+          <a:ln w="3175">
+            <a:solidFill>
+              <a:schemeClr val="accent1">
+                <a:lumMod val="60000"/>
+                <a:lumOff val="40000"/>
+              </a:schemeClr>
+            </a:solidFill>
+          </a:ln>
+        </p:spPr>
+        <p:style>
+          <a:lnRef idx="2">
+            <a:schemeClr val="accent1">
+              <a:shade val="50000"/>
+            </a:schemeClr>
+          </a:lnRef>
+          <a:fillRef idx="1">
+            <a:schemeClr val="accent1"/>
+          </a:fillRef>
+          <a:effectRef idx="0">
+            <a:schemeClr val="accent1"/>
+          </a:effectRef>
+          <a:fontRef idx="minor">
+            <a:schemeClr val="lt1"/>
+          </a:fontRef>
+        </p:style>
+        <p:txBody>
+          <a:bodyPr rtlCol="0" anchor="ctr"/>
+          <a:lstStyle/>
+          <a:p>
+            <a:pPr algn="ctr"/>
+            <a:r>
+              <a:rPr lang="en-US" dirty="0">
+                <a:solidFill>
+                  <a:schemeClr val="accent1">
+                    <a:lumMod val="75000"/>
+                  </a:schemeClr>
+                </a:solidFill>
+              </a:rPr>
+              <a:t>Block 5 </a:t>
+            </a:r>
+          </a:p>
+          <a:p>
+            <a:pPr algn="ctr"/>
+            <a:r>
+              <a:rPr lang="en-US" dirty="0">
+                <a:solidFill>
+                  <a:schemeClr val="accent1">
+                    <a:lumMod val="75000"/>
+                  </a:schemeClr>
+                </a:solidFill>
+              </a:rPr>
+              <a:t>Encoder</a:t>
+            </a:r>
+          </a:p>
+        </p:txBody>
+      </p:sp>
+      <p:sp>
+        <p:nvSpPr>
+          <p:cNvPr id="22" name="TextBox 21">
+            <a:extLst>
+              <a:ext uri="{FF2B5EF4-FFF2-40B4-BE49-F238E27FC236}">
+                <a16:creationId xmlns:a16="http://schemas.microsoft.com/office/drawing/2014/main" id="{B7AE8EB1-3F9C-BB4A-BAD2-AFA3FA99BD42}"/>
+              </a:ext>
+            </a:extLst>
+          </p:cNvPr>
+          <p:cNvSpPr txBox="1"/>
+          <p:nvPr/>
+        </p:nvSpPr>
+        <p:spPr>
+          <a:xfrm rot="16200000">
+            <a:off x="4818868" y="4199155"/>
+            <a:ext cx="748923" cy="369332"/>
+          </a:xfrm>
+          <a:prstGeom prst="rect">
+            <a:avLst/>
+          </a:prstGeom>
+          <a:noFill/>
+        </p:spPr>
+        <p:txBody>
+          <a:bodyPr wrap="none" rtlCol="0">
+            <a:spAutoFit/>
+          </a:bodyPr>
+          <a:lstStyle/>
+          <a:p>
+            <a:r>
+              <a:rPr lang="en-US" dirty="0">
+                <a:solidFill>
+                  <a:schemeClr val="accent1"/>
+                </a:solidFill>
+              </a:rPr>
+              <a:t>uuuu</a:t>
+            </a:r>
+          </a:p>
+        </p:txBody>
+      </p:sp>
+      <p:sp>
+        <p:nvSpPr>
+          <p:cNvPr id="23" name="TextBox 22">
+            <a:extLst>
+              <a:ext uri="{FF2B5EF4-FFF2-40B4-BE49-F238E27FC236}">
+                <a16:creationId xmlns:a16="http://schemas.microsoft.com/office/drawing/2014/main" id="{23EAA979-CBAD-C94C-B953-871D85CCA75F}"/>
+              </a:ext>
+            </a:extLst>
+          </p:cNvPr>
+          <p:cNvSpPr txBox="1"/>
+          <p:nvPr/>
+        </p:nvSpPr>
+        <p:spPr>
+          <a:xfrm rot="16200000">
+            <a:off x="4736040" y="4892992"/>
+            <a:ext cx="914581" cy="369332"/>
+          </a:xfrm>
+          <a:prstGeom prst="rect">
+            <a:avLst/>
+          </a:prstGeom>
+          <a:noFill/>
+        </p:spPr>
+        <p:txBody>
+          <a:bodyPr wrap="square" rtlCol="0">
+            <a:spAutoFit/>
+          </a:bodyPr>
+          <a:lstStyle/>
+          <a:p>
+            <a:r>
+              <a:rPr lang="en-US" dirty="0">
+                <a:solidFill>
+                  <a:schemeClr val="accent1"/>
+                </a:solidFill>
+              </a:rPr>
+              <a:t>uuuu</a:t>
+            </a:r>
+          </a:p>
+        </p:txBody>
+      </p:sp>
+      <p:sp>
+        <p:nvSpPr>
+          <p:cNvPr id="24" name="TextBox 23">
+            <a:extLst>
+              <a:ext uri="{FF2B5EF4-FFF2-40B4-BE49-F238E27FC236}">
+                <a16:creationId xmlns:a16="http://schemas.microsoft.com/office/drawing/2014/main" id="{00959D40-2C33-6845-BE0D-A7A6D7660281}"/>
+              </a:ext>
+            </a:extLst>
+          </p:cNvPr>
+          <p:cNvSpPr txBox="1"/>
+          <p:nvPr/>
+        </p:nvSpPr>
+        <p:spPr>
+          <a:xfrm rot="16200000">
+            <a:off x="4747648" y="3317188"/>
+            <a:ext cx="914581" cy="369332"/>
+          </a:xfrm>
+          <a:prstGeom prst="rect">
+            <a:avLst/>
+          </a:prstGeom>
+          <a:noFill/>
+        </p:spPr>
+        <p:txBody>
+          <a:bodyPr wrap="square" rtlCol="0">
+            <a:spAutoFit/>
+          </a:bodyPr>
+          <a:lstStyle/>
+          <a:p>
+            <a:r>
+              <a:rPr lang="en-US" dirty="0">
+                <a:solidFill>
+                  <a:schemeClr val="accent1"/>
+                </a:solidFill>
+              </a:rPr>
+              <a:t>uuuu</a:t>
+            </a:r>
+          </a:p>
+        </p:txBody>
+      </p:sp>
+      <p:sp>
+        <p:nvSpPr>
+          <p:cNvPr id="25" name="TextBox 24">
+            <a:extLst>
+              <a:ext uri="{FF2B5EF4-FFF2-40B4-BE49-F238E27FC236}">
+                <a16:creationId xmlns:a16="http://schemas.microsoft.com/office/drawing/2014/main" id="{D28C2C04-8DBB-2D4B-BABC-70B5488AA1FD}"/>
+              </a:ext>
+            </a:extLst>
+          </p:cNvPr>
+          <p:cNvSpPr txBox="1"/>
+          <p:nvPr/>
+        </p:nvSpPr>
+        <p:spPr>
+          <a:xfrm rot="16200000">
+            <a:off x="4736040" y="5649630"/>
+            <a:ext cx="914581" cy="369332"/>
+          </a:xfrm>
+          <a:prstGeom prst="rect">
+            <a:avLst/>
+          </a:prstGeom>
+          <a:noFill/>
+        </p:spPr>
+        <p:txBody>
+          <a:bodyPr wrap="square" rtlCol="0">
+            <a:spAutoFit/>
+          </a:bodyPr>
+          <a:lstStyle/>
+          <a:p>
+            <a:r>
+              <a:rPr lang="en-US" dirty="0">
+                <a:solidFill>
+                  <a:schemeClr val="accent1"/>
+                </a:solidFill>
+              </a:rPr>
+              <a:t>uuuu</a:t>
+            </a:r>
+          </a:p>
+        </p:txBody>
+      </p:sp>
+      <p:sp>
+        <p:nvSpPr>
+          <p:cNvPr id="26" name="TextBox 25">
+            <a:extLst>
+              <a:ext uri="{FF2B5EF4-FFF2-40B4-BE49-F238E27FC236}">
+                <a16:creationId xmlns:a16="http://schemas.microsoft.com/office/drawing/2014/main" id="{D35D1871-4398-CC40-80DD-712946201837}"/>
+              </a:ext>
+            </a:extLst>
+          </p:cNvPr>
+          <p:cNvSpPr txBox="1"/>
+          <p:nvPr/>
+        </p:nvSpPr>
+        <p:spPr>
+          <a:xfrm rot="16200000">
+            <a:off x="4747649" y="2526355"/>
+            <a:ext cx="914581" cy="369332"/>
+          </a:xfrm>
+          <a:prstGeom prst="rect">
+            <a:avLst/>
+          </a:prstGeom>
+          <a:noFill/>
+        </p:spPr>
+        <p:txBody>
+          <a:bodyPr wrap="square" rtlCol="0">
+            <a:spAutoFit/>
+          </a:bodyPr>
+          <a:lstStyle/>
+          <a:p>
+            <a:r>
+              <a:rPr lang="en-US" dirty="0">
+                <a:solidFill>
+                  <a:schemeClr val="accent1"/>
+                </a:solidFill>
+              </a:rPr>
+              <a:t>uuuu</a:t>
+            </a:r>
+          </a:p>
+        </p:txBody>
+      </p:sp>
+      <p:cxnSp>
+        <p:nvCxnSpPr>
+          <p:cNvPr id="28" name="Straight Arrow Connector 27">
+            <a:extLst>
+              <a:ext uri="{FF2B5EF4-FFF2-40B4-BE49-F238E27FC236}">
+                <a16:creationId xmlns:a16="http://schemas.microsoft.com/office/drawing/2014/main" id="{14486374-C819-F94E-8C1E-2BA693673748}"/>
+              </a:ext>
+            </a:extLst>
+          </p:cNvPr>
+          <p:cNvCxnSpPr>
+            <a:cxnSpLocks/>
+          </p:cNvCxnSpPr>
+          <p:nvPr/>
+        </p:nvCxnSpPr>
+        <p:spPr>
+          <a:xfrm>
+            <a:off x="5462024" y="4398257"/>
+            <a:ext cx="1888766" cy="518857"/>
+          </a:xfrm>
+          <a:prstGeom prst="straightConnector1">
+            <a:avLst/>
+          </a:prstGeom>
+          <a:ln w="101600">
+            <a:solidFill>
+              <a:schemeClr val="accent1">
+                <a:lumMod val="40000"/>
+                <a:lumOff val="60000"/>
+              </a:schemeClr>
+            </a:solidFill>
+            <a:tailEnd type="triangle"/>
+          </a:ln>
+        </p:spPr>
+        <p:style>
+          <a:lnRef idx="1">
+            <a:schemeClr val="accent1"/>
+          </a:lnRef>
+          <a:fillRef idx="0">
+            <a:schemeClr val="accent1"/>
+          </a:fillRef>
+          <a:effectRef idx="0">
+            <a:schemeClr val="accent1"/>
+          </a:effectRef>
+          <a:fontRef idx="minor">
+            <a:schemeClr val="tx1"/>
+          </a:fontRef>
+        </p:style>
+      </p:cxnSp>
+      <p:cxnSp>
+        <p:nvCxnSpPr>
+          <p:cNvPr id="29" name="Straight Arrow Connector 28">
+            <a:extLst>
+              <a:ext uri="{FF2B5EF4-FFF2-40B4-BE49-F238E27FC236}">
+                <a16:creationId xmlns:a16="http://schemas.microsoft.com/office/drawing/2014/main" id="{18B01197-1A32-0A47-A2D9-F1A08A30D443}"/>
+              </a:ext>
+            </a:extLst>
+          </p:cNvPr>
+          <p:cNvCxnSpPr>
+            <a:cxnSpLocks/>
+            <a:endCxn id="16" idx="3"/>
+          </p:cNvCxnSpPr>
+          <p:nvPr/>
+        </p:nvCxnSpPr>
+        <p:spPr>
+          <a:xfrm>
+            <a:off x="5462024" y="3585402"/>
+            <a:ext cx="2656702" cy="413545"/>
+          </a:xfrm>
+          <a:prstGeom prst="straightConnector1">
+            <a:avLst/>
+          </a:prstGeom>
+          <a:ln w="101600">
+            <a:solidFill>
+              <a:schemeClr val="accent1">
+                <a:lumMod val="40000"/>
+                <a:lumOff val="60000"/>
+              </a:schemeClr>
+            </a:solidFill>
+            <a:tailEnd type="triangle"/>
+          </a:ln>
+        </p:spPr>
+        <p:style>
+          <a:lnRef idx="1">
+            <a:schemeClr val="accent1"/>
+          </a:lnRef>
+          <a:fillRef idx="0">
+            <a:schemeClr val="accent1"/>
+          </a:fillRef>
+          <a:effectRef idx="0">
+            <a:schemeClr val="accent1"/>
+          </a:effectRef>
+          <a:fontRef idx="minor">
+            <a:schemeClr val="tx1"/>
+          </a:fontRef>
+        </p:style>
+      </p:cxnSp>
+      <p:cxnSp>
+        <p:nvCxnSpPr>
+          <p:cNvPr id="30" name="Straight Arrow Connector 29">
+            <a:extLst>
+              <a:ext uri="{FF2B5EF4-FFF2-40B4-BE49-F238E27FC236}">
+                <a16:creationId xmlns:a16="http://schemas.microsoft.com/office/drawing/2014/main" id="{6260FBE8-DC43-7D4C-BA29-0ABB2E5C00E0}"/>
+              </a:ext>
+            </a:extLst>
+          </p:cNvPr>
+          <p:cNvCxnSpPr>
+            <a:cxnSpLocks/>
+          </p:cNvCxnSpPr>
+          <p:nvPr/>
+        </p:nvCxnSpPr>
+        <p:spPr>
+          <a:xfrm>
+            <a:off x="5451390" y="5164249"/>
+            <a:ext cx="1068337" cy="355658"/>
+          </a:xfrm>
+          <a:prstGeom prst="straightConnector1">
+            <a:avLst/>
+          </a:prstGeom>
+          <a:ln w="101600">
+            <a:solidFill>
+              <a:schemeClr val="accent1">
+                <a:lumMod val="40000"/>
+                <a:lumOff val="60000"/>
+              </a:schemeClr>
+            </a:solidFill>
+            <a:tailEnd type="triangle"/>
+          </a:ln>
+        </p:spPr>
+        <p:style>
+          <a:lnRef idx="1">
+            <a:schemeClr val="accent1"/>
+          </a:lnRef>
+          <a:fillRef idx="0">
+            <a:schemeClr val="accent1"/>
+          </a:fillRef>
+          <a:effectRef idx="0">
+            <a:schemeClr val="accent1"/>
+          </a:effectRef>
+          <a:fontRef idx="minor">
+            <a:schemeClr val="tx1"/>
+          </a:fontRef>
+        </p:style>
+      </p:cxnSp>
+      <p:cxnSp>
+        <p:nvCxnSpPr>
+          <p:cNvPr id="35" name="Straight Arrow Connector 34">
+            <a:extLst>
+              <a:ext uri="{FF2B5EF4-FFF2-40B4-BE49-F238E27FC236}">
+                <a16:creationId xmlns:a16="http://schemas.microsoft.com/office/drawing/2014/main" id="{63959074-9A33-A343-93B2-24154441045B}"/>
+              </a:ext>
+            </a:extLst>
+          </p:cNvPr>
+          <p:cNvCxnSpPr>
+            <a:cxnSpLocks/>
+          </p:cNvCxnSpPr>
+          <p:nvPr/>
+        </p:nvCxnSpPr>
+        <p:spPr>
+          <a:xfrm flipV="1">
+            <a:off x="5486737" y="2210742"/>
+            <a:ext cx="3134497" cy="620898"/>
+          </a:xfrm>
+          <a:prstGeom prst="straightConnector1">
+            <a:avLst/>
+          </a:prstGeom>
+          <a:ln w="101600">
+            <a:solidFill>
+              <a:schemeClr val="accent1">
+                <a:lumMod val="40000"/>
+                <a:lumOff val="60000"/>
+              </a:schemeClr>
+            </a:solidFill>
+            <a:tailEnd type="triangle"/>
+          </a:ln>
+        </p:spPr>
+        <p:style>
+          <a:lnRef idx="1">
+            <a:schemeClr val="accent1"/>
+          </a:lnRef>
+          <a:fillRef idx="0">
+            <a:schemeClr val="accent1"/>
+          </a:fillRef>
+          <a:effectRef idx="0">
+            <a:schemeClr val="accent1"/>
+          </a:effectRef>
+          <a:fontRef idx="minor">
+            <a:schemeClr val="tx1"/>
+          </a:fontRef>
+        </p:style>
+      </p:cxnSp>
+      <p:cxnSp>
+        <p:nvCxnSpPr>
+          <p:cNvPr id="37" name="Straight Arrow Connector 36">
+            <a:extLst>
+              <a:ext uri="{FF2B5EF4-FFF2-40B4-BE49-F238E27FC236}">
+                <a16:creationId xmlns:a16="http://schemas.microsoft.com/office/drawing/2014/main" id="{17A59AD2-33C4-8345-8BF0-4DB216CAF491}"/>
+              </a:ext>
+            </a:extLst>
+          </p:cNvPr>
+          <p:cNvCxnSpPr>
+            <a:cxnSpLocks/>
+          </p:cNvCxnSpPr>
+          <p:nvPr/>
+        </p:nvCxnSpPr>
+        <p:spPr>
+          <a:xfrm>
+            <a:off x="5527329" y="5908385"/>
+            <a:ext cx="1182036" cy="0"/>
+          </a:xfrm>
+          <a:prstGeom prst="straightConnector1">
+            <a:avLst/>
+          </a:prstGeom>
+          <a:ln w="101600">
+            <a:solidFill>
+              <a:srgbClr val="002060"/>
+            </a:solidFill>
+            <a:tailEnd type="triangle"/>
+          </a:ln>
+        </p:spPr>
+        <p:style>
+          <a:lnRef idx="1">
+            <a:schemeClr val="accent1"/>
+          </a:lnRef>
+          <a:fillRef idx="0">
+            <a:schemeClr val="accent1"/>
+          </a:fillRef>
+          <a:effectRef idx="0">
+            <a:schemeClr val="accent1"/>
+          </a:effectRef>
+          <a:fontRef idx="minor">
+            <a:schemeClr val="tx1"/>
+          </a:fontRef>
+        </p:style>
+      </p:cxnSp>
+      <p:cxnSp>
+        <p:nvCxnSpPr>
+          <p:cNvPr id="45" name="Straight Arrow Connector 44">
+            <a:extLst>
+              <a:ext uri="{FF2B5EF4-FFF2-40B4-BE49-F238E27FC236}">
+                <a16:creationId xmlns:a16="http://schemas.microsoft.com/office/drawing/2014/main" id="{6CD21CDA-61F2-D64B-B310-6E6CB8E8562E}"/>
+              </a:ext>
+            </a:extLst>
+          </p:cNvPr>
+          <p:cNvCxnSpPr>
+            <a:cxnSpLocks/>
+          </p:cNvCxnSpPr>
+          <p:nvPr/>
+        </p:nvCxnSpPr>
+        <p:spPr>
+          <a:xfrm>
+            <a:off x="3814455" y="2107180"/>
+            <a:ext cx="0" cy="414011"/>
+          </a:xfrm>
+          <a:prstGeom prst="straightConnector1">
+            <a:avLst/>
+          </a:prstGeom>
+          <a:ln w="50800">
+            <a:solidFill>
+              <a:schemeClr val="accent1">
+                <a:lumMod val="40000"/>
+                <a:lumOff val="60000"/>
+              </a:schemeClr>
+            </a:solidFill>
+            <a:tailEnd type="triangle"/>
+          </a:ln>
+        </p:spPr>
+        <p:style>
+          <a:lnRef idx="1">
+            <a:schemeClr val="accent1"/>
+          </a:lnRef>
+          <a:fillRef idx="0">
+            <a:schemeClr val="accent1"/>
+          </a:fillRef>
+          <a:effectRef idx="0">
+            <a:schemeClr val="accent1"/>
+          </a:effectRef>
+          <a:fontRef idx="minor">
+            <a:schemeClr val="tx1"/>
+          </a:fontRef>
+        </p:style>
+      </p:cxnSp>
+      <p:sp>
+        <p:nvSpPr>
+          <p:cNvPr id="48" name="TextBox 47">
+            <a:extLst>
+              <a:ext uri="{FF2B5EF4-FFF2-40B4-BE49-F238E27FC236}">
+                <a16:creationId xmlns:a16="http://schemas.microsoft.com/office/drawing/2014/main" id="{A6ED0C41-B3FA-0A44-8859-2599B1DD4B24}"/>
+              </a:ext>
+            </a:extLst>
+          </p:cNvPr>
+          <p:cNvSpPr txBox="1"/>
+          <p:nvPr/>
+        </p:nvSpPr>
+        <p:spPr>
+          <a:xfrm>
+            <a:off x="5991801" y="1171510"/>
+            <a:ext cx="705642" cy="369332"/>
+          </a:xfrm>
+          <a:prstGeom prst="rect">
+            <a:avLst/>
+          </a:prstGeom>
+          <a:noFill/>
+        </p:spPr>
+        <p:txBody>
+          <a:bodyPr wrap="none" rtlCol="0">
+            <a:spAutoFit/>
+          </a:bodyPr>
+          <a:lstStyle/>
+          <a:p>
+            <a:r>
+              <a:rPr lang="en-US" dirty="0" err="1">
+                <a:solidFill>
+                  <a:schemeClr val="accent1">
+                    <a:lumMod val="75000"/>
+                  </a:schemeClr>
+                </a:solidFill>
+              </a:rPr>
+              <a:t>Unet</a:t>
+            </a:r>
+            <a:endParaRPr lang="en-US" dirty="0">
+              <a:solidFill>
+                <a:schemeClr val="accent1">
+                  <a:lumMod val="75000"/>
+                </a:schemeClr>
+              </a:solidFill>
+            </a:endParaRPr>
+          </a:p>
+        </p:txBody>
+      </p:sp>
+    </p:spTree>
+    <p:extLst>
+      <p:ext uri="{BB962C8B-B14F-4D97-AF65-F5344CB8AC3E}">
+        <p14:creationId xmlns:p14="http://schemas.microsoft.com/office/powerpoint/2010/main" val="2897722884"/>
+      </p:ext>
+    </p:extLst>
+  </p:cSld>
+  <p:clrMapOvr>
+    <a:masterClrMapping/>
+  </p:clrMapOvr>
+  <p:timing>
+    <p:tnLst>
+      <p:par>
+        <p:cTn id="1" dur="indefinite" restart="never" nodeType="tmRoot">
+          <p:childTnLst>
+            <p:seq concurrent="1" nextAc="seek">
+              <p:cTn id="2" dur="indefinite" nodeType="mainSeq">
+                <p:childTnLst>
+                  <p:par>
+                    <p:cTn id="3" fill="hold">
+                      <p:stCondLst>
+                        <p:cond delay="indefinite"/>
+                      </p:stCondLst>
+                      <p:childTnLst>
+                        <p:par>
+                          <p:cTn id="4" fill="hold">
+                            <p:stCondLst>
+                              <p:cond delay="0"/>
+                            </p:stCondLst>
+                            <p:childTnLst>
+                              <p:par>
+                                <p:cTn id="5" presetID="1" presetClass="entr" presetSubtype="0" fill="hold" nodeType="clickEffect">
+                                  <p:stCondLst>
+                                    <p:cond delay="0"/>
+                                  </p:stCondLst>
+                                  <p:childTnLst>
+                                    <p:set>
+                                      <p:cBhvr>
+                                        <p:cTn id="6" dur="1" fill="hold">
+                                          <p:stCondLst>
+                                            <p:cond delay="0"/>
+                                          </p:stCondLst>
+                                        </p:cTn>
+                                        <p:tgtEl>
+                                          <p:spTgt spid="4"/>
+                                        </p:tgtEl>
+                                        <p:attrNameLst>
+                                          <p:attrName>style.visibility</p:attrName>
+                                        </p:attrNameLst>
+                                      </p:cBhvr>
+                                      <p:to>
+                                        <p:strVal val="visible"/>
+                                      </p:to>
+                                    </p:set>
+                                  </p:childTnLst>
+                                </p:cTn>
+                              </p:par>
+                            </p:childTnLst>
+                          </p:cTn>
+                        </p:par>
+                      </p:childTnLst>
+                    </p:cTn>
+                  </p:par>
+                  <p:par>
+                    <p:cTn id="7" fill="hold">
+                      <p:stCondLst>
+                        <p:cond delay="indefinite"/>
+                      </p:stCondLst>
+                      <p:childTnLst>
+                        <p:par>
+                          <p:cTn id="8" fill="hold">
+                            <p:stCondLst>
+                              <p:cond delay="0"/>
+                            </p:stCondLst>
+                            <p:childTnLst>
+                              <p:par>
+                                <p:cTn id="9" presetID="1" presetClass="entr" presetSubtype="0" fill="hold" nodeType="clickEffect">
+                                  <p:stCondLst>
+                                    <p:cond delay="0"/>
+                                  </p:stCondLst>
+                                  <p:childTnLst>
+                                    <p:set>
+                                      <p:cBhvr>
+                                        <p:cTn id="10" dur="1" fill="hold">
+                                          <p:stCondLst>
+                                            <p:cond delay="0"/>
+                                          </p:stCondLst>
+                                        </p:cTn>
+                                        <p:tgtEl>
+                                          <p:spTgt spid="19"/>
+                                        </p:tgtEl>
+                                        <p:attrNameLst>
+                                          <p:attrName>style.visibility</p:attrName>
+                                        </p:attrNameLst>
+                                      </p:cBhvr>
+                                      <p:to>
+                                        <p:strVal val="visible"/>
+                                      </p:to>
+                                    </p:set>
+                                  </p:childTnLst>
+                                </p:cTn>
+                              </p:par>
+                            </p:childTnLst>
+                          </p:cTn>
+                        </p:par>
+                      </p:childTnLst>
+                    </p:cTn>
+                  </p:par>
+                  <p:par>
+                    <p:cTn id="11" fill="hold">
+                      <p:stCondLst>
+                        <p:cond delay="indefinite"/>
+                      </p:stCondLst>
+                      <p:childTnLst>
+                        <p:par>
+                          <p:cTn id="12" fill="hold">
+                            <p:stCondLst>
+                              <p:cond delay="0"/>
+                            </p:stCondLst>
+                            <p:childTnLst>
+                              <p:par>
+                                <p:cTn id="13" presetID="1" presetClass="entr" presetSubtype="0" fill="hold" grpId="0" nodeType="clickEffect">
+                                  <p:stCondLst>
+                                    <p:cond delay="0"/>
+                                  </p:stCondLst>
+                                  <p:childTnLst>
+                                    <p:set>
+                                      <p:cBhvr>
+                                        <p:cTn id="14" dur="1" fill="hold">
+                                          <p:stCondLst>
+                                            <p:cond delay="0"/>
+                                          </p:stCondLst>
+                                        </p:cTn>
+                                        <p:tgtEl>
+                                          <p:spTgt spid="46"/>
+                                        </p:tgtEl>
+                                        <p:attrNameLst>
+                                          <p:attrName>style.visibility</p:attrName>
+                                        </p:attrNameLst>
+                                      </p:cBhvr>
+                                      <p:to>
+                                        <p:strVal val="visible"/>
+                                      </p:to>
+                                    </p:set>
+                                  </p:childTnLst>
+                                </p:cTn>
+                              </p:par>
+                            </p:childTnLst>
+                          </p:cTn>
+                        </p:par>
+                      </p:childTnLst>
+                    </p:cTn>
+                  </p:par>
+                  <p:par>
+                    <p:cTn id="15" fill="hold">
+                      <p:stCondLst>
+                        <p:cond delay="indefinite"/>
+                      </p:stCondLst>
+                      <p:childTnLst>
+                        <p:par>
+                          <p:cTn id="16" fill="hold">
+                            <p:stCondLst>
+                              <p:cond delay="0"/>
+                            </p:stCondLst>
+                            <p:childTnLst>
+                              <p:par>
+                                <p:cTn id="17" presetID="1" presetClass="entr" presetSubtype="0" fill="hold" grpId="0" nodeType="clickEffect">
+                                  <p:stCondLst>
+                                    <p:cond delay="0"/>
+                                  </p:stCondLst>
+                                  <p:childTnLst>
+                                    <p:set>
+                                      <p:cBhvr>
+                                        <p:cTn id="18" dur="1" fill="hold">
+                                          <p:stCondLst>
+                                            <p:cond delay="0"/>
+                                          </p:stCondLst>
+                                        </p:cTn>
+                                        <p:tgtEl>
+                                          <p:spTgt spid="9"/>
+                                        </p:tgtEl>
+                                        <p:attrNameLst>
+                                          <p:attrName>style.visibility</p:attrName>
+                                        </p:attrNameLst>
+                                      </p:cBhvr>
+                                      <p:to>
+                                        <p:strVal val="visible"/>
+                                      </p:to>
+                                    </p:set>
+                                  </p:childTnLst>
+                                </p:cTn>
+                              </p:par>
+                            </p:childTnLst>
+                          </p:cTn>
+                        </p:par>
+                      </p:childTnLst>
+                    </p:cTn>
+                  </p:par>
+                  <p:par>
+                    <p:cTn id="19" fill="hold">
+                      <p:stCondLst>
+                        <p:cond delay="indefinite"/>
+                      </p:stCondLst>
+                      <p:childTnLst>
+                        <p:par>
+                          <p:cTn id="20" fill="hold">
+                            <p:stCondLst>
+                              <p:cond delay="0"/>
+                            </p:stCondLst>
+                            <p:childTnLst>
+                              <p:par>
+                                <p:cTn id="21" presetID="1" presetClass="entr" presetSubtype="0" fill="hold" nodeType="clickEffect">
+                                  <p:stCondLst>
+                                    <p:cond delay="0"/>
+                                  </p:stCondLst>
+                                  <p:childTnLst>
+                                    <p:set>
+                                      <p:cBhvr>
+                                        <p:cTn id="22" dur="1" fill="hold">
+                                          <p:stCondLst>
+                                            <p:cond delay="0"/>
+                                          </p:stCondLst>
+                                        </p:cTn>
+                                        <p:tgtEl>
+                                          <p:spTgt spid="45"/>
+                                        </p:tgtEl>
+                                        <p:attrNameLst>
+                                          <p:attrName>style.visibility</p:attrName>
+                                        </p:attrNameLst>
+                                      </p:cBhvr>
+                                      <p:to>
+                                        <p:strVal val="visible"/>
+                                      </p:to>
+                                    </p:set>
+                                  </p:childTnLst>
+                                </p:cTn>
+                              </p:par>
+                              <p:par>
+                                <p:cTn id="23" presetID="1" presetClass="entr" presetSubtype="0" fill="hold" grpId="0" nodeType="withEffect">
+                                  <p:stCondLst>
+                                    <p:cond delay="0"/>
+                                  </p:stCondLst>
+                                  <p:childTnLst>
+                                    <p:set>
+                                      <p:cBhvr>
+                                        <p:cTn id="24" dur="1" fill="hold">
+                                          <p:stCondLst>
+                                            <p:cond delay="0"/>
+                                          </p:stCondLst>
+                                        </p:cTn>
+                                        <p:tgtEl>
+                                          <p:spTgt spid="10"/>
+                                        </p:tgtEl>
+                                        <p:attrNameLst>
+                                          <p:attrName>style.visibility</p:attrName>
+                                        </p:attrNameLst>
+                                      </p:cBhvr>
+                                      <p:to>
+                                        <p:strVal val="visible"/>
+                                      </p:to>
+                                    </p:set>
+                                  </p:childTnLst>
+                                </p:cTn>
+                              </p:par>
+                              <p:par>
+                                <p:cTn id="25" presetID="1" presetClass="entr" presetSubtype="0" fill="hold" grpId="0" nodeType="withEffect">
+                                  <p:stCondLst>
+                                    <p:cond delay="0"/>
+                                  </p:stCondLst>
+                                  <p:childTnLst>
+                                    <p:set>
+                                      <p:cBhvr>
+                                        <p:cTn id="26" dur="1" fill="hold">
+                                          <p:stCondLst>
+                                            <p:cond delay="0"/>
+                                          </p:stCondLst>
+                                        </p:cTn>
+                                        <p:tgtEl>
+                                          <p:spTgt spid="26"/>
+                                        </p:tgtEl>
+                                        <p:attrNameLst>
+                                          <p:attrName>style.visibility</p:attrName>
+                                        </p:attrNameLst>
+                                      </p:cBhvr>
+                                      <p:to>
+                                        <p:strVal val="visible"/>
+                                      </p:to>
+                                    </p:set>
+                                  </p:childTnLst>
+                                </p:cTn>
+                              </p:par>
+                            </p:childTnLst>
+                          </p:cTn>
+                        </p:par>
+                      </p:childTnLst>
+                    </p:cTn>
+                  </p:par>
+                  <p:par>
+                    <p:cTn id="27" fill="hold">
+                      <p:stCondLst>
+                        <p:cond delay="indefinite"/>
+                      </p:stCondLst>
+                      <p:childTnLst>
+                        <p:par>
+                          <p:cTn id="28" fill="hold">
+                            <p:stCondLst>
+                              <p:cond delay="0"/>
+                            </p:stCondLst>
+                            <p:childTnLst>
+                              <p:par>
+                                <p:cTn id="29" presetID="1" presetClass="entr" presetSubtype="0" fill="hold" nodeType="clickEffect">
+                                  <p:stCondLst>
+                                    <p:cond delay="0"/>
+                                  </p:stCondLst>
+                                  <p:childTnLst>
+                                    <p:set>
+                                      <p:cBhvr>
+                                        <p:cTn id="30" dur="1" fill="hold">
+                                          <p:stCondLst>
+                                            <p:cond delay="0"/>
+                                          </p:stCondLst>
+                                        </p:cTn>
+                                        <p:tgtEl>
+                                          <p:spTgt spid="39"/>
+                                        </p:tgtEl>
+                                        <p:attrNameLst>
+                                          <p:attrName>style.visibility</p:attrName>
+                                        </p:attrNameLst>
+                                      </p:cBhvr>
+                                      <p:to>
+                                        <p:strVal val="visible"/>
+                                      </p:to>
+                                    </p:set>
+                                  </p:childTnLst>
+                                </p:cTn>
+                              </p:par>
+                              <p:par>
+                                <p:cTn id="31" presetID="1" presetClass="entr" presetSubtype="0" fill="hold" grpId="0" nodeType="withEffect">
+                                  <p:stCondLst>
+                                    <p:cond delay="0"/>
+                                  </p:stCondLst>
+                                  <p:childTnLst>
+                                    <p:set>
+                                      <p:cBhvr>
+                                        <p:cTn id="32" dur="1" fill="hold">
+                                          <p:stCondLst>
+                                            <p:cond delay="0"/>
+                                          </p:stCondLst>
+                                        </p:cTn>
+                                        <p:tgtEl>
+                                          <p:spTgt spid="11"/>
+                                        </p:tgtEl>
+                                        <p:attrNameLst>
+                                          <p:attrName>style.visibility</p:attrName>
+                                        </p:attrNameLst>
+                                      </p:cBhvr>
+                                      <p:to>
+                                        <p:strVal val="visible"/>
+                                      </p:to>
+                                    </p:set>
+                                  </p:childTnLst>
+                                </p:cTn>
+                              </p:par>
+                            </p:childTnLst>
+                          </p:cTn>
+                        </p:par>
+                      </p:childTnLst>
+                    </p:cTn>
+                  </p:par>
+                  <p:par>
+                    <p:cTn id="33" fill="hold">
+                      <p:stCondLst>
+                        <p:cond delay="indefinite"/>
+                      </p:stCondLst>
+                      <p:childTnLst>
+                        <p:par>
+                          <p:cTn id="34" fill="hold">
+                            <p:stCondLst>
+                              <p:cond delay="0"/>
+                            </p:stCondLst>
+                            <p:childTnLst>
+                              <p:par>
+                                <p:cTn id="35" presetID="1" presetClass="entr" presetSubtype="0" fill="hold" grpId="0" nodeType="clickEffect">
+                                  <p:stCondLst>
+                                    <p:cond delay="0"/>
+                                  </p:stCondLst>
+                                  <p:childTnLst>
+                                    <p:set>
+                                      <p:cBhvr>
+                                        <p:cTn id="36" dur="1" fill="hold">
+                                          <p:stCondLst>
+                                            <p:cond delay="0"/>
+                                          </p:stCondLst>
+                                        </p:cTn>
+                                        <p:tgtEl>
+                                          <p:spTgt spid="24"/>
+                                        </p:tgtEl>
+                                        <p:attrNameLst>
+                                          <p:attrName>style.visibility</p:attrName>
+                                        </p:attrNameLst>
+                                      </p:cBhvr>
+                                      <p:to>
+                                        <p:strVal val="visible"/>
+                                      </p:to>
+                                    </p:set>
+                                  </p:childTnLst>
+                                </p:cTn>
+                              </p:par>
+                            </p:childTnLst>
+                          </p:cTn>
+                        </p:par>
+                      </p:childTnLst>
+                    </p:cTn>
+                  </p:par>
+                  <p:par>
+                    <p:cTn id="37" fill="hold">
+                      <p:stCondLst>
+                        <p:cond delay="indefinite"/>
+                      </p:stCondLst>
+                      <p:childTnLst>
+                        <p:par>
+                          <p:cTn id="38" fill="hold">
+                            <p:stCondLst>
+                              <p:cond delay="0"/>
+                            </p:stCondLst>
+                            <p:childTnLst>
+                              <p:par>
+                                <p:cTn id="39" presetID="1" presetClass="entr" presetSubtype="0" fill="hold" nodeType="clickEffect">
+                                  <p:stCondLst>
+                                    <p:cond delay="0"/>
+                                  </p:stCondLst>
+                                  <p:childTnLst>
+                                    <p:set>
+                                      <p:cBhvr>
+                                        <p:cTn id="40" dur="1" fill="hold">
+                                          <p:stCondLst>
+                                            <p:cond delay="0"/>
+                                          </p:stCondLst>
+                                        </p:cTn>
+                                        <p:tgtEl>
+                                          <p:spTgt spid="42"/>
+                                        </p:tgtEl>
+                                        <p:attrNameLst>
+                                          <p:attrName>style.visibility</p:attrName>
+                                        </p:attrNameLst>
+                                      </p:cBhvr>
+                                      <p:to>
+                                        <p:strVal val="visible"/>
+                                      </p:to>
+                                    </p:set>
+                                  </p:childTnLst>
+                                </p:cTn>
+                              </p:par>
+                            </p:childTnLst>
+                          </p:cTn>
+                        </p:par>
+                      </p:childTnLst>
+                    </p:cTn>
+                  </p:par>
+                  <p:par>
+                    <p:cTn id="41" fill="hold">
+                      <p:stCondLst>
+                        <p:cond delay="indefinite"/>
+                      </p:stCondLst>
+                      <p:childTnLst>
+                        <p:par>
+                          <p:cTn id="42" fill="hold">
+                            <p:stCondLst>
+                              <p:cond delay="0"/>
+                            </p:stCondLst>
+                            <p:childTnLst>
+                              <p:par>
+                                <p:cTn id="43" presetID="1" presetClass="entr" presetSubtype="0" fill="hold" grpId="0" nodeType="clickEffect">
+                                  <p:stCondLst>
+                                    <p:cond delay="0"/>
+                                  </p:stCondLst>
+                                  <p:childTnLst>
+                                    <p:set>
+                                      <p:cBhvr>
+                                        <p:cTn id="44" dur="1" fill="hold">
+                                          <p:stCondLst>
+                                            <p:cond delay="0"/>
+                                          </p:stCondLst>
+                                        </p:cTn>
+                                        <p:tgtEl>
+                                          <p:spTgt spid="12"/>
+                                        </p:tgtEl>
+                                        <p:attrNameLst>
+                                          <p:attrName>style.visibility</p:attrName>
+                                        </p:attrNameLst>
+                                      </p:cBhvr>
+                                      <p:to>
+                                        <p:strVal val="visible"/>
+                                      </p:to>
+                                    </p:set>
+                                  </p:childTnLst>
+                                </p:cTn>
+                              </p:par>
+                              <p:par>
+                                <p:cTn id="45" presetID="1" presetClass="entr" presetSubtype="0" fill="hold" grpId="0" nodeType="withEffect">
+                                  <p:stCondLst>
+                                    <p:cond delay="0"/>
+                                  </p:stCondLst>
+                                  <p:childTnLst>
+                                    <p:set>
+                                      <p:cBhvr>
+                                        <p:cTn id="46" dur="1" fill="hold">
+                                          <p:stCondLst>
+                                            <p:cond delay="0"/>
+                                          </p:stCondLst>
+                                        </p:cTn>
+                                        <p:tgtEl>
+                                          <p:spTgt spid="22"/>
+                                        </p:tgtEl>
+                                        <p:attrNameLst>
+                                          <p:attrName>style.visibility</p:attrName>
+                                        </p:attrNameLst>
+                                      </p:cBhvr>
+                                      <p:to>
+                                        <p:strVal val="visible"/>
+                                      </p:to>
+                                    </p:set>
+                                  </p:childTnLst>
+                                </p:cTn>
+                              </p:par>
+                            </p:childTnLst>
+                          </p:cTn>
+                        </p:par>
+                      </p:childTnLst>
+                    </p:cTn>
+                  </p:par>
+                  <p:par>
+                    <p:cTn id="47" fill="hold">
+                      <p:stCondLst>
+                        <p:cond delay="indefinite"/>
+                      </p:stCondLst>
+                      <p:childTnLst>
+                        <p:par>
+                          <p:cTn id="48" fill="hold">
+                            <p:stCondLst>
+                              <p:cond delay="0"/>
+                            </p:stCondLst>
+                            <p:childTnLst>
+                              <p:par>
+                                <p:cTn id="49" presetID="1" presetClass="entr" presetSubtype="0" fill="hold" nodeType="clickEffect">
+                                  <p:stCondLst>
+                                    <p:cond delay="0"/>
+                                  </p:stCondLst>
+                                  <p:childTnLst>
+                                    <p:set>
+                                      <p:cBhvr>
+                                        <p:cTn id="50" dur="1" fill="hold">
+                                          <p:stCondLst>
+                                            <p:cond delay="0"/>
+                                          </p:stCondLst>
+                                        </p:cTn>
+                                        <p:tgtEl>
+                                          <p:spTgt spid="43"/>
+                                        </p:tgtEl>
+                                        <p:attrNameLst>
+                                          <p:attrName>style.visibility</p:attrName>
+                                        </p:attrNameLst>
+                                      </p:cBhvr>
+                                      <p:to>
+                                        <p:strVal val="visible"/>
+                                      </p:to>
+                                    </p:set>
+                                  </p:childTnLst>
+                                </p:cTn>
+                              </p:par>
+                            </p:childTnLst>
+                          </p:cTn>
+                        </p:par>
+                      </p:childTnLst>
+                    </p:cTn>
+                  </p:par>
+                  <p:par>
+                    <p:cTn id="51" fill="hold">
+                      <p:stCondLst>
+                        <p:cond delay="indefinite"/>
+                      </p:stCondLst>
+                      <p:childTnLst>
+                        <p:par>
+                          <p:cTn id="52" fill="hold">
+                            <p:stCondLst>
+                              <p:cond delay="0"/>
+                            </p:stCondLst>
+                            <p:childTnLst>
+                              <p:par>
+                                <p:cTn id="53" presetID="1" presetClass="entr" presetSubtype="0" fill="hold" grpId="0" nodeType="clickEffect">
+                                  <p:stCondLst>
+                                    <p:cond delay="0"/>
+                                  </p:stCondLst>
+                                  <p:childTnLst>
+                                    <p:set>
+                                      <p:cBhvr>
+                                        <p:cTn id="54" dur="1" fill="hold">
+                                          <p:stCondLst>
+                                            <p:cond delay="0"/>
+                                          </p:stCondLst>
+                                        </p:cTn>
+                                        <p:tgtEl>
+                                          <p:spTgt spid="13"/>
+                                        </p:tgtEl>
+                                        <p:attrNameLst>
+                                          <p:attrName>style.visibility</p:attrName>
+                                        </p:attrNameLst>
+                                      </p:cBhvr>
+                                      <p:to>
+                                        <p:strVal val="visible"/>
+                                      </p:to>
+                                    </p:set>
+                                  </p:childTnLst>
+                                </p:cTn>
+                              </p:par>
+                            </p:childTnLst>
+                          </p:cTn>
+                        </p:par>
+                      </p:childTnLst>
+                    </p:cTn>
+                  </p:par>
+                  <p:par>
+                    <p:cTn id="55" fill="hold">
+                      <p:stCondLst>
+                        <p:cond delay="indefinite"/>
+                      </p:stCondLst>
+                      <p:childTnLst>
+                        <p:par>
+                          <p:cTn id="56" fill="hold">
+                            <p:stCondLst>
+                              <p:cond delay="0"/>
+                            </p:stCondLst>
+                            <p:childTnLst>
+                              <p:par>
+                                <p:cTn id="57" presetID="1" presetClass="entr" presetSubtype="0" fill="hold" grpId="0" nodeType="clickEffect">
+                                  <p:stCondLst>
+                                    <p:cond delay="0"/>
+                                  </p:stCondLst>
+                                  <p:childTnLst>
+                                    <p:set>
+                                      <p:cBhvr>
+                                        <p:cTn id="58" dur="1" fill="hold">
+                                          <p:stCondLst>
+                                            <p:cond delay="0"/>
+                                          </p:stCondLst>
+                                        </p:cTn>
+                                        <p:tgtEl>
+                                          <p:spTgt spid="23"/>
+                                        </p:tgtEl>
+                                        <p:attrNameLst>
+                                          <p:attrName>style.visibility</p:attrName>
+                                        </p:attrNameLst>
+                                      </p:cBhvr>
+                                      <p:to>
+                                        <p:strVal val="visible"/>
+                                      </p:to>
+                                    </p:set>
+                                  </p:childTnLst>
+                                </p:cTn>
+                              </p:par>
+                            </p:childTnLst>
+                          </p:cTn>
+                        </p:par>
+                      </p:childTnLst>
+                    </p:cTn>
+                  </p:par>
+                  <p:par>
+                    <p:cTn id="59" fill="hold">
+                      <p:stCondLst>
+                        <p:cond delay="indefinite"/>
+                      </p:stCondLst>
+                      <p:childTnLst>
+                        <p:par>
+                          <p:cTn id="60" fill="hold">
+                            <p:stCondLst>
+                              <p:cond delay="0"/>
+                            </p:stCondLst>
+                            <p:childTnLst>
+                              <p:par>
+                                <p:cTn id="61" presetID="1" presetClass="entr" presetSubtype="0" fill="hold" nodeType="clickEffect">
+                                  <p:stCondLst>
+                                    <p:cond delay="0"/>
+                                  </p:stCondLst>
+                                  <p:childTnLst>
+                                    <p:set>
+                                      <p:cBhvr>
+                                        <p:cTn id="62" dur="1" fill="hold">
+                                          <p:stCondLst>
+                                            <p:cond delay="0"/>
+                                          </p:stCondLst>
+                                        </p:cTn>
+                                        <p:tgtEl>
+                                          <p:spTgt spid="44"/>
+                                        </p:tgtEl>
+                                        <p:attrNameLst>
+                                          <p:attrName>style.visibility</p:attrName>
+                                        </p:attrNameLst>
+                                      </p:cBhvr>
+                                      <p:to>
+                                        <p:strVal val="visible"/>
+                                      </p:to>
+                                    </p:set>
+                                  </p:childTnLst>
+                                </p:cTn>
+                              </p:par>
+                            </p:childTnLst>
+                          </p:cTn>
+                        </p:par>
+                      </p:childTnLst>
+                    </p:cTn>
+                  </p:par>
+                  <p:par>
+                    <p:cTn id="63" fill="hold">
+                      <p:stCondLst>
+                        <p:cond delay="indefinite"/>
+                      </p:stCondLst>
+                      <p:childTnLst>
+                        <p:par>
+                          <p:cTn id="64" fill="hold">
+                            <p:stCondLst>
+                              <p:cond delay="0"/>
+                            </p:stCondLst>
+                            <p:childTnLst>
+                              <p:par>
+                                <p:cTn id="65" presetID="1" presetClass="entr" presetSubtype="0" fill="hold" grpId="0" nodeType="clickEffect">
+                                  <p:stCondLst>
+                                    <p:cond delay="0"/>
+                                  </p:stCondLst>
+                                  <p:childTnLst>
+                                    <p:set>
+                                      <p:cBhvr>
+                                        <p:cTn id="66" dur="1" fill="hold">
+                                          <p:stCondLst>
+                                            <p:cond delay="0"/>
+                                          </p:stCondLst>
+                                        </p:cTn>
+                                        <p:tgtEl>
+                                          <p:spTgt spid="14"/>
+                                        </p:tgtEl>
+                                        <p:attrNameLst>
+                                          <p:attrName>style.visibility</p:attrName>
+                                        </p:attrNameLst>
+                                      </p:cBhvr>
+                                      <p:to>
+                                        <p:strVal val="visible"/>
+                                      </p:to>
+                                    </p:set>
+                                  </p:childTnLst>
+                                </p:cTn>
+                              </p:par>
+                              <p:par>
+                                <p:cTn id="67" presetID="1" presetClass="entr" presetSubtype="0" fill="hold" grpId="0" nodeType="withEffect">
+                                  <p:stCondLst>
+                                    <p:cond delay="0"/>
+                                  </p:stCondLst>
+                                  <p:childTnLst>
+                                    <p:set>
+                                      <p:cBhvr>
+                                        <p:cTn id="68" dur="1" fill="hold">
+                                          <p:stCondLst>
+                                            <p:cond delay="0"/>
+                                          </p:stCondLst>
+                                        </p:cTn>
+                                        <p:tgtEl>
+                                          <p:spTgt spid="25"/>
+                                        </p:tgtEl>
+                                        <p:attrNameLst>
+                                          <p:attrName>style.visibility</p:attrName>
+                                        </p:attrNameLst>
+                                      </p:cBhvr>
+                                      <p:to>
+                                        <p:strVal val="visible"/>
+                                      </p:to>
+                                    </p:set>
+                                  </p:childTnLst>
+                                </p:cTn>
+                              </p:par>
+                            </p:childTnLst>
+                          </p:cTn>
+                        </p:par>
+                      </p:childTnLst>
+                    </p:cTn>
+                  </p:par>
+                  <p:par>
+                    <p:cTn id="69" fill="hold">
+                      <p:stCondLst>
+                        <p:cond delay="indefinite"/>
+                      </p:stCondLst>
+                      <p:childTnLst>
+                        <p:par>
+                          <p:cTn id="70" fill="hold">
+                            <p:stCondLst>
+                              <p:cond delay="0"/>
+                            </p:stCondLst>
+                            <p:childTnLst>
+                              <p:par>
+                                <p:cTn id="71" presetID="1" presetClass="entr" presetSubtype="0" fill="hold" nodeType="clickEffect">
+                                  <p:stCondLst>
+                                    <p:cond delay="0"/>
+                                  </p:stCondLst>
+                                  <p:childTnLst>
+                                    <p:set>
+                                      <p:cBhvr>
+                                        <p:cTn id="72" dur="1" fill="hold">
+                                          <p:stCondLst>
+                                            <p:cond delay="0"/>
+                                          </p:stCondLst>
+                                        </p:cTn>
+                                        <p:tgtEl>
+                                          <p:spTgt spid="37"/>
+                                        </p:tgtEl>
+                                        <p:attrNameLst>
+                                          <p:attrName>style.visibility</p:attrName>
+                                        </p:attrNameLst>
+                                      </p:cBhvr>
+                                      <p:to>
+                                        <p:strVal val="visible"/>
+                                      </p:to>
+                                    </p:set>
+                                  </p:childTnLst>
+                                </p:cTn>
+                              </p:par>
+                            </p:childTnLst>
+                          </p:cTn>
+                        </p:par>
+                      </p:childTnLst>
+                    </p:cTn>
+                  </p:par>
+                  <p:par>
+                    <p:cTn id="73" fill="hold">
+                      <p:stCondLst>
+                        <p:cond delay="indefinite"/>
+                      </p:stCondLst>
+                      <p:childTnLst>
+                        <p:par>
+                          <p:cTn id="74" fill="hold">
+                            <p:stCondLst>
+                              <p:cond delay="0"/>
+                            </p:stCondLst>
+                            <p:childTnLst>
+                              <p:par>
+                                <p:cTn id="75" presetID="1" presetClass="entr" presetSubtype="0" fill="hold" nodeType="clickEffect">
+                                  <p:stCondLst>
+                                    <p:cond delay="0"/>
+                                  </p:stCondLst>
+                                  <p:childTnLst>
+                                    <p:set>
+                                      <p:cBhvr>
+                                        <p:cTn id="76" dur="1" fill="hold">
+                                          <p:stCondLst>
+                                            <p:cond delay="0"/>
+                                          </p:stCondLst>
+                                        </p:cTn>
+                                        <p:tgtEl>
+                                          <p:spTgt spid="30"/>
+                                        </p:tgtEl>
+                                        <p:attrNameLst>
+                                          <p:attrName>style.visibility</p:attrName>
+                                        </p:attrNameLst>
+                                      </p:cBhvr>
+                                      <p:to>
+                                        <p:strVal val="visible"/>
+                                      </p:to>
+                                    </p:set>
+                                  </p:childTnLst>
+                                </p:cTn>
+                              </p:par>
+                            </p:childTnLst>
+                          </p:cTn>
+                        </p:par>
+                      </p:childTnLst>
+                    </p:cTn>
+                  </p:par>
+                  <p:par>
+                    <p:cTn id="77" fill="hold">
+                      <p:stCondLst>
+                        <p:cond delay="indefinite"/>
+                      </p:stCondLst>
+                      <p:childTnLst>
+                        <p:par>
+                          <p:cTn id="78" fill="hold">
+                            <p:stCondLst>
+                              <p:cond delay="0"/>
+                            </p:stCondLst>
+                            <p:childTnLst>
+                              <p:par>
+                                <p:cTn id="79" presetID="1" presetClass="entr" presetSubtype="0" fill="hold" nodeType="clickEffect">
+                                  <p:stCondLst>
+                                    <p:cond delay="0"/>
+                                  </p:stCondLst>
+                                  <p:childTnLst>
+                                    <p:set>
+                                      <p:cBhvr>
+                                        <p:cTn id="80" dur="1" fill="hold">
+                                          <p:stCondLst>
+                                            <p:cond delay="0"/>
+                                          </p:stCondLst>
+                                        </p:cTn>
+                                        <p:tgtEl>
+                                          <p:spTgt spid="28"/>
+                                        </p:tgtEl>
+                                        <p:attrNameLst>
+                                          <p:attrName>style.visibility</p:attrName>
+                                        </p:attrNameLst>
+                                      </p:cBhvr>
+                                      <p:to>
+                                        <p:strVal val="visible"/>
+                                      </p:to>
+                                    </p:set>
+                                  </p:childTnLst>
+                                </p:cTn>
+                              </p:par>
+                            </p:childTnLst>
+                          </p:cTn>
+                        </p:par>
+                      </p:childTnLst>
+                    </p:cTn>
+                  </p:par>
+                  <p:par>
+                    <p:cTn id="81" fill="hold">
+                      <p:stCondLst>
+                        <p:cond delay="indefinite"/>
+                      </p:stCondLst>
+                      <p:childTnLst>
+                        <p:par>
+                          <p:cTn id="82" fill="hold">
+                            <p:stCondLst>
+                              <p:cond delay="0"/>
+                            </p:stCondLst>
+                            <p:childTnLst>
+                              <p:par>
+                                <p:cTn id="83" presetID="1" presetClass="entr" presetSubtype="0" fill="hold" nodeType="clickEffect">
+                                  <p:stCondLst>
+                                    <p:cond delay="0"/>
+                                  </p:stCondLst>
+                                  <p:childTnLst>
+                                    <p:set>
+                                      <p:cBhvr>
+                                        <p:cTn id="84" dur="1" fill="hold">
+                                          <p:stCondLst>
+                                            <p:cond delay="0"/>
+                                          </p:stCondLst>
+                                        </p:cTn>
+                                        <p:tgtEl>
+                                          <p:spTgt spid="29"/>
+                                        </p:tgtEl>
+                                        <p:attrNameLst>
+                                          <p:attrName>style.visibility</p:attrName>
+                                        </p:attrNameLst>
+                                      </p:cBhvr>
+                                      <p:to>
+                                        <p:strVal val="visible"/>
+                                      </p:to>
+                                    </p:set>
+                                  </p:childTnLst>
+                                </p:cTn>
+                              </p:par>
+                            </p:childTnLst>
+                          </p:cTn>
+                        </p:par>
+                      </p:childTnLst>
+                    </p:cTn>
+                  </p:par>
+                  <p:par>
+                    <p:cTn id="85" fill="hold">
+                      <p:stCondLst>
+                        <p:cond delay="indefinite"/>
+                      </p:stCondLst>
+                      <p:childTnLst>
+                        <p:par>
+                          <p:cTn id="86" fill="hold">
+                            <p:stCondLst>
+                              <p:cond delay="0"/>
+                            </p:stCondLst>
+                            <p:childTnLst>
+                              <p:par>
+                                <p:cTn id="87" presetID="1" presetClass="entr" presetSubtype="0" fill="hold" nodeType="clickEffect">
+                                  <p:stCondLst>
+                                    <p:cond delay="0"/>
+                                  </p:stCondLst>
+                                  <p:childTnLst>
+                                    <p:set>
+                                      <p:cBhvr>
+                                        <p:cTn id="88" dur="1" fill="hold">
+                                          <p:stCondLst>
+                                            <p:cond delay="0"/>
+                                          </p:stCondLst>
+                                        </p:cTn>
+                                        <p:tgtEl>
+                                          <p:spTgt spid="35"/>
+                                        </p:tgtEl>
+                                        <p:attrNameLst>
+                                          <p:attrName>style.visibility</p:attrName>
+                                        </p:attrNameLst>
+                                      </p:cBhvr>
+                                      <p:to>
+                                        <p:strVal val="visible"/>
+                                      </p:to>
+                                    </p:set>
+                                  </p:childTnLst>
+                                </p:cTn>
+                              </p:par>
+                            </p:childTnLst>
+                          </p:cTn>
+                        </p:par>
+                      </p:childTnLst>
+                    </p:cTn>
+                  </p:par>
+                </p:childTnLst>
+              </p:cTn>
+              <p:prevCondLst>
+                <p:cond evt="onPrev" delay="0">
+                  <p:tgtEl>
+                    <p:sldTgt/>
+                  </p:tgtEl>
+                </p:cond>
+              </p:prevCondLst>
+              <p:nextCondLst>
+                <p:cond evt="onNext" delay="0">
+                  <p:tgtEl>
+                    <p:sldTgt/>
+                  </p:tgtEl>
+                </p:cond>
+              </p:nextCondLst>
+            </p:seq>
+          </p:childTnLst>
+        </p:cTn>
+      </p:par>
+    </p:tnLst>
+    <p:bldLst>
+      <p:bldP spid="46" grpId="0" animBg="1"/>
+      <p:bldP spid="9" grpId="0" animBg="1"/>
+      <p:bldP spid="10" grpId="0" animBg="1"/>
+      <p:bldP spid="11" grpId="0" animBg="1"/>
+      <p:bldP spid="12" grpId="0" animBg="1"/>
+      <p:bldP spid="13" grpId="0" animBg="1"/>
+      <p:bldP spid="14" grpId="0" animBg="1"/>
+      <p:bldP spid="22" grpId="0"/>
+      <p:bldP spid="23" grpId="0"/>
+      <p:bldP spid="24" grpId="0"/>
+      <p:bldP spid="25" grpId="0"/>
+      <p:bldP spid="26" grpId="0"/>
+    </p:bldLst>
+  </p:timing>
+</p:sld>
+</file>
+
 <file path=ppt/theme/theme1.xml><?xml version="1.0" encoding="utf-8"?>
 <a:theme xmlns:a="http://schemas.openxmlformats.org/drawingml/2006/main" name="Mesh">
   <a:themeElements>

</xml_diff>